<commit_message>
Add to algorithms slides
</commit_message>
<xml_diff>
--- a/Lecture_Algorithms.pptx
+++ b/Lecture_Algorithms.pptx
@@ -10,6 +10,39 @@
     <p:sldId id="258" r:id="rId4"/>
     <p:sldId id="259" r:id="rId5"/>
     <p:sldId id="260" r:id="rId6"/>
+    <p:sldId id="261" r:id="rId7"/>
+    <p:sldId id="262" r:id="rId8"/>
+    <p:sldId id="263" r:id="rId9"/>
+    <p:sldId id="264" r:id="rId10"/>
+    <p:sldId id="265" r:id="rId11"/>
+    <p:sldId id="266" r:id="rId12"/>
+    <p:sldId id="267" r:id="rId13"/>
+    <p:sldId id="268" r:id="rId14"/>
+    <p:sldId id="270" r:id="rId15"/>
+    <p:sldId id="271" r:id="rId16"/>
+    <p:sldId id="272" r:id="rId17"/>
+    <p:sldId id="273" r:id="rId18"/>
+    <p:sldId id="274" r:id="rId19"/>
+    <p:sldId id="275" r:id="rId20"/>
+    <p:sldId id="276" r:id="rId21"/>
+    <p:sldId id="279" r:id="rId22"/>
+    <p:sldId id="278" r:id="rId23"/>
+    <p:sldId id="277" r:id="rId24"/>
+    <p:sldId id="280" r:id="rId25"/>
+    <p:sldId id="281" r:id="rId26"/>
+    <p:sldId id="282" r:id="rId27"/>
+    <p:sldId id="283" r:id="rId28"/>
+    <p:sldId id="284" r:id="rId29"/>
+    <p:sldId id="285" r:id="rId30"/>
+    <p:sldId id="286" r:id="rId31"/>
+    <p:sldId id="287" r:id="rId32"/>
+    <p:sldId id="288" r:id="rId33"/>
+    <p:sldId id="289" r:id="rId34"/>
+    <p:sldId id="290" r:id="rId35"/>
+    <p:sldId id="291" r:id="rId36"/>
+    <p:sldId id="292" r:id="rId37"/>
+    <p:sldId id="293" r:id="rId38"/>
+    <p:sldId id="294" r:id="rId39"/>
   </p:sldIdLst>
   <p:sldSz cx="12192000" cy="6858000"/>
   <p:notesSz cx="6858000" cy="9144000"/>
@@ -108,6 +141,11 @@
       </a:defRPr>
     </a:lvl9pPr>
   </p:defaultTextStyle>
+  <p:extLst>
+    <p:ext uri="{EFAFB233-063F-42B5-8137-9DF3F51BA10A}">
+      <p15:sldGuideLst xmlns:p15="http://schemas.microsoft.com/office/powerpoint/2012/main"/>
+    </p:ext>
+  </p:extLst>
 </p:presentation>
 </file>
 
@@ -242,7 +280,7 @@
           <a:p>
             <a:fld id="{2AF15665-46F5-41AD-BDB9-EF073834DAA9}" type="datetimeFigureOut">
               <a:rPr lang="en-CA" smtClean="0"/>
-              <a:t>2019-08-19</a:t>
+              <a:t>2019-08-20</a:t>
             </a:fld>
             <a:endParaRPr lang="en-CA"/>
           </a:p>
@@ -412,7 +450,7 @@
           <a:p>
             <a:fld id="{2AF15665-46F5-41AD-BDB9-EF073834DAA9}" type="datetimeFigureOut">
               <a:rPr lang="en-CA" smtClean="0"/>
-              <a:t>2019-08-19</a:t>
+              <a:t>2019-08-20</a:t>
             </a:fld>
             <a:endParaRPr lang="en-CA"/>
           </a:p>
@@ -592,7 +630,7 @@
           <a:p>
             <a:fld id="{2AF15665-46F5-41AD-BDB9-EF073834DAA9}" type="datetimeFigureOut">
               <a:rPr lang="en-CA" smtClean="0"/>
-              <a:t>2019-08-19</a:t>
+              <a:t>2019-08-20</a:t>
             </a:fld>
             <a:endParaRPr lang="en-CA"/>
           </a:p>
@@ -762,7 +800,7 @@
           <a:p>
             <a:fld id="{2AF15665-46F5-41AD-BDB9-EF073834DAA9}" type="datetimeFigureOut">
               <a:rPr lang="en-CA" smtClean="0"/>
-              <a:t>2019-08-19</a:t>
+              <a:t>2019-08-20</a:t>
             </a:fld>
             <a:endParaRPr lang="en-CA"/>
           </a:p>
@@ -1008,7 +1046,7 @@
           <a:p>
             <a:fld id="{2AF15665-46F5-41AD-BDB9-EF073834DAA9}" type="datetimeFigureOut">
               <a:rPr lang="en-CA" smtClean="0"/>
-              <a:t>2019-08-19</a:t>
+              <a:t>2019-08-20</a:t>
             </a:fld>
             <a:endParaRPr lang="en-CA"/>
           </a:p>
@@ -1240,7 +1278,7 @@
           <a:p>
             <a:fld id="{2AF15665-46F5-41AD-BDB9-EF073834DAA9}" type="datetimeFigureOut">
               <a:rPr lang="en-CA" smtClean="0"/>
-              <a:t>2019-08-19</a:t>
+              <a:t>2019-08-20</a:t>
             </a:fld>
             <a:endParaRPr lang="en-CA"/>
           </a:p>
@@ -1607,7 +1645,7 @@
           <a:p>
             <a:fld id="{2AF15665-46F5-41AD-BDB9-EF073834DAA9}" type="datetimeFigureOut">
               <a:rPr lang="en-CA" smtClean="0"/>
-              <a:t>2019-08-19</a:t>
+              <a:t>2019-08-20</a:t>
             </a:fld>
             <a:endParaRPr lang="en-CA"/>
           </a:p>
@@ -1725,7 +1763,7 @@
           <a:p>
             <a:fld id="{2AF15665-46F5-41AD-BDB9-EF073834DAA9}" type="datetimeFigureOut">
               <a:rPr lang="en-CA" smtClean="0"/>
-              <a:t>2019-08-19</a:t>
+              <a:t>2019-08-20</a:t>
             </a:fld>
             <a:endParaRPr lang="en-CA"/>
           </a:p>
@@ -1820,7 +1858,7 @@
           <a:p>
             <a:fld id="{2AF15665-46F5-41AD-BDB9-EF073834DAA9}" type="datetimeFigureOut">
               <a:rPr lang="en-CA" smtClean="0"/>
-              <a:t>2019-08-19</a:t>
+              <a:t>2019-08-20</a:t>
             </a:fld>
             <a:endParaRPr lang="en-CA"/>
           </a:p>
@@ -2097,7 +2135,7 @@
           <a:p>
             <a:fld id="{2AF15665-46F5-41AD-BDB9-EF073834DAA9}" type="datetimeFigureOut">
               <a:rPr lang="en-CA" smtClean="0"/>
-              <a:t>2019-08-19</a:t>
+              <a:t>2019-08-20</a:t>
             </a:fld>
             <a:endParaRPr lang="en-CA"/>
           </a:p>
@@ -2350,7 +2388,7 @@
           <a:p>
             <a:fld id="{2AF15665-46F5-41AD-BDB9-EF073834DAA9}" type="datetimeFigureOut">
               <a:rPr lang="en-CA" smtClean="0"/>
-              <a:t>2019-08-19</a:t>
+              <a:t>2019-08-20</a:t>
             </a:fld>
             <a:endParaRPr lang="en-CA"/>
           </a:p>
@@ -2563,7 +2601,7 @@
           <a:p>
             <a:fld id="{2AF15665-46F5-41AD-BDB9-EF073834DAA9}" type="datetimeFigureOut">
               <a:rPr lang="en-CA" smtClean="0"/>
-              <a:t>2019-08-19</a:t>
+              <a:t>2019-08-20</a:t>
             </a:fld>
             <a:endParaRPr lang="en-CA"/>
           </a:p>
@@ -3028,6 +3066,1198 @@
   <p:clrMapOvr>
     <a:masterClrMapping/>
   </p:clrMapOvr>
+  <p:timing>
+    <p:tnLst>
+      <p:par>
+        <p:cTn id="1" dur="indefinite" restart="never" nodeType="tmRoot"/>
+      </p:par>
+    </p:tnLst>
+  </p:timing>
+</p:sld>
+</file>
+
+<file path=ppt/slides/slide10.xml><?xml version="1.0" encoding="utf-8"?>
+<p:sld xmlns:a="http://schemas.openxmlformats.org/drawingml/2006/main" xmlns:r="http://schemas.openxmlformats.org/officeDocument/2006/relationships" xmlns:p="http://schemas.openxmlformats.org/presentationml/2006/main">
+  <p:cSld>
+    <p:spTree>
+      <p:nvGrpSpPr>
+        <p:cNvPr id="1" name=""/>
+        <p:cNvGrpSpPr/>
+        <p:nvPr/>
+      </p:nvGrpSpPr>
+      <p:grpSpPr>
+        <a:xfrm>
+          <a:off x="0" y="0"/>
+          <a:ext cx="0" cy="0"/>
+          <a:chOff x="0" y="0"/>
+          <a:chExt cx="0" cy="0"/>
+        </a:xfrm>
+      </p:grpSpPr>
+      <p:sp>
+        <p:nvSpPr>
+          <p:cNvPr id="2" name="Title 1"/>
+          <p:cNvSpPr>
+            <a:spLocks noGrp="1"/>
+          </p:cNvSpPr>
+          <p:nvPr>
+            <p:ph type="title"/>
+          </p:nvPr>
+        </p:nvSpPr>
+        <p:spPr/>
+        <p:txBody>
+          <a:bodyPr/>
+          <a:lstStyle/>
+          <a:p>
+            <a:r>
+              <a:rPr lang="en-CA" dirty="0" smtClean="0"/>
+              <a:t>Divide and conquer: constructing decision trees pg105</a:t>
+            </a:r>
+            <a:endParaRPr lang="en-CA" dirty="0"/>
+          </a:p>
+        </p:txBody>
+      </p:sp>
+      <p:sp>
+        <p:nvSpPr>
+          <p:cNvPr id="3" name="Content Placeholder 2"/>
+          <p:cNvSpPr>
+            <a:spLocks noGrp="1"/>
+          </p:cNvSpPr>
+          <p:nvPr>
+            <p:ph idx="1"/>
+          </p:nvPr>
+        </p:nvSpPr>
+        <p:spPr/>
+        <p:txBody>
+          <a:bodyPr/>
+          <a:lstStyle/>
+          <a:p>
+            <a:r>
+              <a:rPr lang="en-CA" dirty="0" smtClean="0"/>
+              <a:t>1) select attribute to place at root node and create branch for each value of attribute</a:t>
+            </a:r>
+          </a:p>
+          <a:p>
+            <a:r>
+              <a:rPr lang="en-CA" dirty="0" smtClean="0"/>
+              <a:t>Repeat this process recursively for each branch, using only the instances that reached the branch</a:t>
+            </a:r>
+          </a:p>
+          <a:p>
+            <a:r>
+              <a:rPr lang="en-CA" dirty="0" smtClean="0"/>
+              <a:t>Any leaf with only one class (Yes/no) will not be split further (we want this!)</a:t>
+            </a:r>
+          </a:p>
+          <a:p>
+            <a:r>
+              <a:rPr lang="en-CA" dirty="0" smtClean="0"/>
+              <a:t>How can we make the tree as short as possible?</a:t>
+            </a:r>
+          </a:p>
+          <a:p>
+            <a:r>
+              <a:rPr lang="en-CA" dirty="0" smtClean="0"/>
+              <a:t>Use information gain</a:t>
+            </a:r>
+            <a:endParaRPr lang="en-CA" dirty="0"/>
+          </a:p>
+        </p:txBody>
+      </p:sp>
+    </p:spTree>
+    <p:extLst>
+      <p:ext uri="{BB962C8B-B14F-4D97-AF65-F5344CB8AC3E}">
+        <p14:creationId xmlns:p14="http://schemas.microsoft.com/office/powerpoint/2010/main" val="902583763"/>
+      </p:ext>
+    </p:extLst>
+  </p:cSld>
+  <p:clrMapOvr>
+    <a:masterClrMapping/>
+  </p:clrMapOvr>
+  <p:timing>
+    <p:tnLst>
+      <p:par>
+        <p:cTn id="1" dur="indefinite" restart="never" nodeType="tmRoot"/>
+      </p:par>
+    </p:tnLst>
+  </p:timing>
+</p:sld>
+</file>
+
+<file path=ppt/slides/slide11.xml><?xml version="1.0" encoding="utf-8"?>
+<p:sld xmlns:a="http://schemas.openxmlformats.org/drawingml/2006/main" xmlns:r="http://schemas.openxmlformats.org/officeDocument/2006/relationships" xmlns:p="http://schemas.openxmlformats.org/presentationml/2006/main">
+  <p:cSld>
+    <p:spTree>
+      <p:nvGrpSpPr>
+        <p:cNvPr id="1" name=""/>
+        <p:cNvGrpSpPr/>
+        <p:nvPr/>
+      </p:nvGrpSpPr>
+      <p:grpSpPr>
+        <a:xfrm>
+          <a:off x="0" y="0"/>
+          <a:ext cx="0" cy="0"/>
+          <a:chOff x="0" y="0"/>
+          <a:chExt cx="0" cy="0"/>
+        </a:xfrm>
+      </p:grpSpPr>
+      <p:sp>
+        <p:nvSpPr>
+          <p:cNvPr id="2" name="Title 1"/>
+          <p:cNvSpPr>
+            <a:spLocks noGrp="1"/>
+          </p:cNvSpPr>
+          <p:nvPr>
+            <p:ph type="title"/>
+          </p:nvPr>
+        </p:nvSpPr>
+        <p:spPr/>
+        <p:txBody>
+          <a:bodyPr/>
+          <a:lstStyle/>
+          <a:p>
+            <a:r>
+              <a:rPr lang="en-CA" dirty="0" smtClean="0"/>
+              <a:t>Calculating information pg108</a:t>
+            </a:r>
+            <a:endParaRPr lang="en-CA" dirty="0"/>
+          </a:p>
+        </p:txBody>
+      </p:sp>
+      <p:sp>
+        <p:nvSpPr>
+          <p:cNvPr id="3" name="Content Placeholder 2"/>
+          <p:cNvSpPr>
+            <a:spLocks noGrp="1"/>
+          </p:cNvSpPr>
+          <p:nvPr>
+            <p:ph idx="1"/>
+          </p:nvPr>
+        </p:nvSpPr>
+        <p:spPr/>
+        <p:txBody>
+          <a:bodyPr/>
+          <a:lstStyle/>
+          <a:p>
+            <a:r>
+              <a:rPr lang="en-CA" dirty="0" smtClean="0"/>
+              <a:t>How to calculate information measures used as basis for evaluating different splits?</a:t>
+            </a:r>
+          </a:p>
+          <a:p>
+            <a:r>
+              <a:rPr lang="en-CA" dirty="0" smtClean="0"/>
+              <a:t>We expect this quantity to have following properties:</a:t>
+            </a:r>
+          </a:p>
+          <a:p>
+            <a:pPr lvl="1"/>
+            <a:r>
+              <a:rPr lang="en-CA" dirty="0" smtClean="0"/>
+              <a:t>When number of either yes’s or no’s is zero, information=zero</a:t>
+            </a:r>
+          </a:p>
+          <a:p>
+            <a:pPr lvl="1"/>
+            <a:r>
+              <a:rPr lang="en-CA" dirty="0" smtClean="0"/>
+              <a:t>When the number of yes’s = number of no’s, information=max</a:t>
+            </a:r>
+          </a:p>
+          <a:p>
+            <a:r>
+              <a:rPr lang="en-CA" dirty="0" smtClean="0"/>
+              <a:t>Decisions can be made in single or multiple stages, and the amount of information is the same in both cases</a:t>
+            </a:r>
+          </a:p>
+          <a:p>
+            <a:pPr lvl="1"/>
+            <a:r>
+              <a:rPr lang="en-CA" dirty="0" smtClean="0"/>
+              <a:t>Thus, information should also obey multistage property</a:t>
+            </a:r>
+          </a:p>
+          <a:p>
+            <a:r>
+              <a:rPr lang="en-CA" dirty="0" smtClean="0"/>
+              <a:t>Entropy function satisfies these properties (entropy example)</a:t>
+            </a:r>
+          </a:p>
+          <a:p>
+            <a:pPr lvl="1"/>
+            <a:endParaRPr lang="en-CA" dirty="0" smtClean="0"/>
+          </a:p>
+        </p:txBody>
+      </p:sp>
+    </p:spTree>
+    <p:extLst>
+      <p:ext uri="{BB962C8B-B14F-4D97-AF65-F5344CB8AC3E}">
+        <p14:creationId xmlns:p14="http://schemas.microsoft.com/office/powerpoint/2010/main" val="1828752595"/>
+      </p:ext>
+    </p:extLst>
+  </p:cSld>
+  <p:clrMapOvr>
+    <a:masterClrMapping/>
+  </p:clrMapOvr>
+  <p:timing>
+    <p:tnLst>
+      <p:par>
+        <p:cTn id="1" dur="indefinite" restart="never" nodeType="tmRoot"/>
+      </p:par>
+    </p:tnLst>
+  </p:timing>
+</p:sld>
+</file>
+
+<file path=ppt/slides/slide12.xml><?xml version="1.0" encoding="utf-8"?>
+<p:sld xmlns:a="http://schemas.openxmlformats.org/drawingml/2006/main" xmlns:r="http://schemas.openxmlformats.org/officeDocument/2006/relationships" xmlns:p="http://schemas.openxmlformats.org/presentationml/2006/main">
+  <p:cSld>
+    <p:spTree>
+      <p:nvGrpSpPr>
+        <p:cNvPr id="1" name=""/>
+        <p:cNvGrpSpPr/>
+        <p:nvPr/>
+      </p:nvGrpSpPr>
+      <p:grpSpPr>
+        <a:xfrm>
+          <a:off x="0" y="0"/>
+          <a:ext cx="0" cy="0"/>
+          <a:chOff x="0" y="0"/>
+          <a:chExt cx="0" cy="0"/>
+        </a:xfrm>
+      </p:grpSpPr>
+      <p:sp>
+        <p:nvSpPr>
+          <p:cNvPr id="2" name="Title 1"/>
+          <p:cNvSpPr>
+            <a:spLocks noGrp="1"/>
+          </p:cNvSpPr>
+          <p:nvPr>
+            <p:ph type="title"/>
+          </p:nvPr>
+        </p:nvSpPr>
+        <p:spPr/>
+        <p:txBody>
+          <a:bodyPr/>
+          <a:lstStyle/>
+          <a:p>
+            <a:r>
+              <a:rPr lang="fr-CA" dirty="0" err="1" smtClean="0"/>
+              <a:t>Highly</a:t>
+            </a:r>
+            <a:r>
+              <a:rPr lang="fr-CA" dirty="0" smtClean="0"/>
+              <a:t> </a:t>
+            </a:r>
+            <a:r>
+              <a:rPr lang="fr-CA" dirty="0" err="1" smtClean="0"/>
+              <a:t>branching</a:t>
+            </a:r>
+            <a:r>
+              <a:rPr lang="fr-CA" dirty="0" smtClean="0"/>
+              <a:t> </a:t>
+            </a:r>
+            <a:r>
+              <a:rPr lang="fr-CA" dirty="0" err="1" smtClean="0"/>
+              <a:t>attributes</a:t>
+            </a:r>
+            <a:r>
+              <a:rPr lang="fr-CA" dirty="0" smtClean="0"/>
+              <a:t> pg111</a:t>
+            </a:r>
+            <a:endParaRPr lang="en-CA" dirty="0"/>
+          </a:p>
+        </p:txBody>
+      </p:sp>
+      <p:sp>
+        <p:nvSpPr>
+          <p:cNvPr id="3" name="Content Placeholder 2"/>
+          <p:cNvSpPr>
+            <a:spLocks noGrp="1"/>
+          </p:cNvSpPr>
+          <p:nvPr>
+            <p:ph idx="1"/>
+          </p:nvPr>
+        </p:nvSpPr>
+        <p:spPr/>
+        <p:txBody>
+          <a:bodyPr/>
+          <a:lstStyle/>
+          <a:p>
+            <a:r>
+              <a:rPr lang="en-CA" dirty="0" smtClean="0"/>
+              <a:t>Problem: when some attributes have a large number of possible values, giving rise to multiway branch with many child nodes</a:t>
+            </a:r>
+          </a:p>
+          <a:p>
+            <a:r>
+              <a:rPr lang="en-CA" dirty="0" smtClean="0"/>
+              <a:t>Entropy=0 when branching on ID code of each instance, which is useless</a:t>
+            </a:r>
+          </a:p>
+          <a:p>
+            <a:r>
+              <a:rPr lang="en-CA" dirty="0" smtClean="0"/>
+              <a:t>Raw information gain prefers attributes with large number of values</a:t>
+            </a:r>
+          </a:p>
+          <a:p>
+            <a:r>
+              <a:rPr lang="en-CA" dirty="0" smtClean="0"/>
+              <a:t>Gain ratio can be used to compensate for this</a:t>
+            </a:r>
+          </a:p>
+          <a:p>
+            <a:pPr lvl="1"/>
+            <a:r>
+              <a:rPr lang="en-CA" dirty="0" smtClean="0"/>
+              <a:t>Takes into account number and size of daughter nodes into which an attribute splits the dataset</a:t>
+            </a:r>
+          </a:p>
+          <a:p>
+            <a:pPr lvl="1"/>
+            <a:r>
+              <a:rPr lang="en-CA" dirty="0" smtClean="0"/>
+              <a:t>Takes into account the number of bits to determine which branch each instance is assigned (more branches = more info required)</a:t>
+            </a:r>
+          </a:p>
+          <a:p>
+            <a:endParaRPr lang="en-CA" dirty="0" smtClean="0"/>
+          </a:p>
+          <a:p>
+            <a:endParaRPr lang="en-CA" dirty="0"/>
+          </a:p>
+        </p:txBody>
+      </p:sp>
+    </p:spTree>
+    <p:extLst>
+      <p:ext uri="{BB962C8B-B14F-4D97-AF65-F5344CB8AC3E}">
+        <p14:creationId xmlns:p14="http://schemas.microsoft.com/office/powerpoint/2010/main" val="560622354"/>
+      </p:ext>
+    </p:extLst>
+  </p:cSld>
+  <p:clrMapOvr>
+    <a:masterClrMapping/>
+  </p:clrMapOvr>
+  <p:timing>
+    <p:tnLst>
+      <p:par>
+        <p:cTn id="1" dur="indefinite" restart="never" nodeType="tmRoot"/>
+      </p:par>
+    </p:tnLst>
+  </p:timing>
+</p:sld>
+</file>
+
+<file path=ppt/slides/slide13.xml><?xml version="1.0" encoding="utf-8"?>
+<p:sld xmlns:a="http://schemas.openxmlformats.org/drawingml/2006/main" xmlns:r="http://schemas.openxmlformats.org/officeDocument/2006/relationships" xmlns:p="http://schemas.openxmlformats.org/presentationml/2006/main">
+  <p:cSld>
+    <p:spTree>
+      <p:nvGrpSpPr>
+        <p:cNvPr id="1" name=""/>
+        <p:cNvGrpSpPr/>
+        <p:nvPr/>
+      </p:nvGrpSpPr>
+      <p:grpSpPr>
+        <a:xfrm>
+          <a:off x="0" y="0"/>
+          <a:ext cx="0" cy="0"/>
+          <a:chOff x="0" y="0"/>
+          <a:chExt cx="0" cy="0"/>
+        </a:xfrm>
+      </p:grpSpPr>
+      <p:sp>
+        <p:nvSpPr>
+          <p:cNvPr id="2" name="Title 1"/>
+          <p:cNvSpPr>
+            <a:spLocks noGrp="1"/>
+          </p:cNvSpPr>
+          <p:nvPr>
+            <p:ph type="title"/>
+          </p:nvPr>
+        </p:nvSpPr>
+        <p:spPr/>
+        <p:txBody>
+          <a:bodyPr/>
+          <a:lstStyle/>
+          <a:p>
+            <a:r>
+              <a:rPr lang="en-CA" dirty="0" smtClean="0"/>
+              <a:t>Covering algorithms: constructing rules pg112</a:t>
+            </a:r>
+            <a:endParaRPr lang="en-CA" dirty="0"/>
+          </a:p>
+        </p:txBody>
+      </p:sp>
+      <p:sp>
+        <p:nvSpPr>
+          <p:cNvPr id="3" name="Content Placeholder 2"/>
+          <p:cNvSpPr>
+            <a:spLocks noGrp="1"/>
+          </p:cNvSpPr>
+          <p:nvPr>
+            <p:ph idx="1"/>
+          </p:nvPr>
+        </p:nvSpPr>
+        <p:spPr/>
+        <p:txBody>
+          <a:bodyPr/>
+          <a:lstStyle/>
+          <a:p>
+            <a:r>
+              <a:rPr lang="en-CA" dirty="0" smtClean="0"/>
+              <a:t>Decision trees can produce rules, but it will generate many rules and it is not trivial to produce effective rules from a decision tree</a:t>
+            </a:r>
+          </a:p>
+          <a:p>
+            <a:r>
+              <a:rPr lang="en-CA" dirty="0" smtClean="0"/>
+              <a:t>Alternative approach: take each class in turn, and seek a way of covering all instances in it, at the same time excluding instances not in the class</a:t>
+            </a:r>
+            <a:endParaRPr lang="en-CA" dirty="0"/>
+          </a:p>
+        </p:txBody>
+      </p:sp>
+    </p:spTree>
+    <p:extLst>
+      <p:ext uri="{BB962C8B-B14F-4D97-AF65-F5344CB8AC3E}">
+        <p14:creationId xmlns:p14="http://schemas.microsoft.com/office/powerpoint/2010/main" val="3759414801"/>
+      </p:ext>
+    </p:extLst>
+  </p:cSld>
+  <p:clrMapOvr>
+    <a:masterClrMapping/>
+  </p:clrMapOvr>
+  <p:timing>
+    <p:tnLst>
+      <p:par>
+        <p:cTn id="1" dur="indefinite" restart="never" nodeType="tmRoot"/>
+      </p:par>
+    </p:tnLst>
+  </p:timing>
+</p:sld>
+</file>
+
+<file path=ppt/slides/slide14.xml><?xml version="1.0" encoding="utf-8"?>
+<p:sld xmlns:a="http://schemas.openxmlformats.org/drawingml/2006/main" xmlns:r="http://schemas.openxmlformats.org/officeDocument/2006/relationships" xmlns:p="http://schemas.openxmlformats.org/presentationml/2006/main">
+  <p:cSld>
+    <p:spTree>
+      <p:nvGrpSpPr>
+        <p:cNvPr id="1" name=""/>
+        <p:cNvGrpSpPr/>
+        <p:nvPr/>
+      </p:nvGrpSpPr>
+      <p:grpSpPr>
+        <a:xfrm>
+          <a:off x="0" y="0"/>
+          <a:ext cx="0" cy="0"/>
+          <a:chOff x="0" y="0"/>
+          <a:chExt cx="0" cy="0"/>
+        </a:xfrm>
+      </p:grpSpPr>
+      <p:sp>
+        <p:nvSpPr>
+          <p:cNvPr id="2" name="Title 1"/>
+          <p:cNvSpPr>
+            <a:spLocks noGrp="1"/>
+          </p:cNvSpPr>
+          <p:nvPr>
+            <p:ph type="title"/>
+          </p:nvPr>
+        </p:nvSpPr>
+        <p:spPr/>
+        <p:txBody>
+          <a:bodyPr/>
+          <a:lstStyle/>
+          <a:p>
+            <a:r>
+              <a:rPr lang="en-CA" dirty="0" smtClean="0"/>
+              <a:t>A simple covering algorithm pg114</a:t>
+            </a:r>
+            <a:endParaRPr lang="en-CA" dirty="0"/>
+          </a:p>
+        </p:txBody>
+      </p:sp>
+      <p:sp>
+        <p:nvSpPr>
+          <p:cNvPr id="3" name="Content Placeholder 2"/>
+          <p:cNvSpPr>
+            <a:spLocks noGrp="1"/>
+          </p:cNvSpPr>
+          <p:nvPr>
+            <p:ph idx="1"/>
+          </p:nvPr>
+        </p:nvSpPr>
+        <p:spPr/>
+        <p:txBody>
+          <a:bodyPr>
+            <a:normAutofit fontScale="70000" lnSpcReduction="20000"/>
+          </a:bodyPr>
+          <a:lstStyle/>
+          <a:p>
+            <a:r>
+              <a:rPr lang="en-CA" dirty="0"/>
+              <a:t>In some instances, top-down divide and conquer produce results similar to covering </a:t>
+            </a:r>
+            <a:r>
+              <a:rPr lang="en-CA" dirty="0" smtClean="0"/>
+              <a:t>rules, however </a:t>
+            </a:r>
+            <a:r>
+              <a:rPr lang="en-CA" dirty="0"/>
+              <a:t>in some cases trees can be much larger than an equivalent set of </a:t>
+            </a:r>
+            <a:r>
+              <a:rPr lang="en-CA" dirty="0" smtClean="0"/>
+              <a:t>rules</a:t>
+            </a:r>
+          </a:p>
+          <a:p>
+            <a:r>
+              <a:rPr lang="en-CA" dirty="0" smtClean="0"/>
+              <a:t>Divide and conquer algorithms choose an attribute to maximize information gain, covering algorithms choose an attribute-value pair to maximize probability of desired classification</a:t>
+            </a:r>
+          </a:p>
+          <a:p>
+            <a:r>
+              <a:rPr lang="en-CA" dirty="0" smtClean="0"/>
+              <a:t>Suppose rule covers t instances, where p are positive examples of the class, and t-p is the number of errors. We will maximize ratio p/t</a:t>
+            </a:r>
+          </a:p>
+          <a:p>
+            <a:r>
+              <a:rPr lang="en-CA" dirty="0" smtClean="0"/>
+              <a:t>Start by seeking a rule: if ? Then recommendation = hard</a:t>
+            </a:r>
+          </a:p>
+          <a:p>
+            <a:r>
+              <a:rPr lang="en-CA" dirty="0" smtClean="0"/>
+              <a:t>Then, search all attributes and select most correct</a:t>
+            </a:r>
+          </a:p>
+          <a:p>
+            <a:r>
+              <a:rPr lang="en-CA" dirty="0" smtClean="0"/>
+              <a:t>Then, add another term to the rule: if astigmatism=yes and ? Then recommendation=hard</a:t>
+            </a:r>
+          </a:p>
+          <a:p>
+            <a:r>
+              <a:rPr lang="en-CA" dirty="0" smtClean="0"/>
+              <a:t>In the event of a tie (in accuracy), choose the attribute with more coverage</a:t>
+            </a:r>
+          </a:p>
+          <a:p>
+            <a:r>
+              <a:rPr lang="en-CA" dirty="0" smtClean="0"/>
+              <a:t>Then, delete the instances and start again with reduced data set, repeat until all instances have been classed</a:t>
+            </a:r>
+          </a:p>
+          <a:p>
+            <a:r>
+              <a:rPr lang="en-CA" dirty="0" smtClean="0"/>
+              <a:t>This is the PRISM method for constructing rules</a:t>
+            </a:r>
+            <a:endParaRPr lang="en-CA" dirty="0"/>
+          </a:p>
+          <a:p>
+            <a:endParaRPr lang="en-CA" dirty="0"/>
+          </a:p>
+        </p:txBody>
+      </p:sp>
+    </p:spTree>
+    <p:extLst>
+      <p:ext uri="{BB962C8B-B14F-4D97-AF65-F5344CB8AC3E}">
+        <p14:creationId xmlns:p14="http://schemas.microsoft.com/office/powerpoint/2010/main" val="2144679078"/>
+      </p:ext>
+    </p:extLst>
+  </p:cSld>
+  <p:clrMapOvr>
+    <a:masterClrMapping/>
+  </p:clrMapOvr>
+  <p:timing>
+    <p:tnLst>
+      <p:par>
+        <p:cTn id="1" dur="indefinite" restart="never" nodeType="tmRoot"/>
+      </p:par>
+    </p:tnLst>
+  </p:timing>
+</p:sld>
+</file>
+
+<file path=ppt/slides/slide15.xml><?xml version="1.0" encoding="utf-8"?>
+<p:sld xmlns:a="http://schemas.openxmlformats.org/drawingml/2006/main" xmlns:r="http://schemas.openxmlformats.org/officeDocument/2006/relationships" xmlns:p="http://schemas.openxmlformats.org/presentationml/2006/main">
+  <p:cSld>
+    <p:spTree>
+      <p:nvGrpSpPr>
+        <p:cNvPr id="1" name=""/>
+        <p:cNvGrpSpPr/>
+        <p:nvPr/>
+      </p:nvGrpSpPr>
+      <p:grpSpPr>
+        <a:xfrm>
+          <a:off x="0" y="0"/>
+          <a:ext cx="0" cy="0"/>
+          <a:chOff x="0" y="0"/>
+          <a:chExt cx="0" cy="0"/>
+        </a:xfrm>
+      </p:grpSpPr>
+      <p:sp>
+        <p:nvSpPr>
+          <p:cNvPr id="2" name="Title 1"/>
+          <p:cNvSpPr>
+            <a:spLocks noGrp="1"/>
+          </p:cNvSpPr>
+          <p:nvPr>
+            <p:ph type="title"/>
+          </p:nvPr>
+        </p:nvSpPr>
+        <p:spPr/>
+        <p:txBody>
+          <a:bodyPr/>
+          <a:lstStyle/>
+          <a:p>
+            <a:r>
+              <a:rPr lang="en-CA" dirty="0" smtClean="0"/>
+              <a:t>Rules vs decision lists pg118</a:t>
+            </a:r>
+            <a:endParaRPr lang="en-CA" dirty="0"/>
+          </a:p>
+        </p:txBody>
+      </p:sp>
+      <p:sp>
+        <p:nvSpPr>
+          <p:cNvPr id="3" name="Content Placeholder 2"/>
+          <p:cNvSpPr>
+            <a:spLocks noGrp="1"/>
+          </p:cNvSpPr>
+          <p:nvPr>
+            <p:ph idx="1"/>
+          </p:nvPr>
+        </p:nvSpPr>
+        <p:spPr/>
+        <p:txBody>
+          <a:bodyPr>
+            <a:normAutofit lnSpcReduction="10000"/>
+          </a:bodyPr>
+          <a:lstStyle/>
+          <a:p>
+            <a:r>
+              <a:rPr lang="en-CA" dirty="0" smtClean="0"/>
+              <a:t>Though it appears from the resulting rules of PRISM that we must interpret the rules in order, this is not the case</a:t>
+            </a:r>
+          </a:p>
+          <a:p>
+            <a:r>
+              <a:rPr lang="en-CA" dirty="0" smtClean="0"/>
+              <a:t>The rules that are produced by PRISM can be executed in any order</a:t>
+            </a:r>
+          </a:p>
+          <a:p>
+            <a:r>
+              <a:rPr lang="en-CA" dirty="0" smtClean="0"/>
+              <a:t>However, sometimes a test example may receive multiple classifications in which case it is not clear what to do</a:t>
+            </a:r>
+          </a:p>
+          <a:p>
+            <a:r>
+              <a:rPr lang="en-CA" dirty="0" smtClean="0"/>
+              <a:t>Decision lists do not suffer from this problem as they stop executing once a rule has been found, and always have a default class</a:t>
+            </a:r>
+          </a:p>
+          <a:p>
+            <a:r>
+              <a:rPr lang="en-CA" dirty="0" smtClean="0"/>
+              <a:t>Separate and conquer  vs divide and conquer</a:t>
+            </a:r>
+          </a:p>
+          <a:p>
+            <a:pPr lvl="1"/>
+            <a:r>
+              <a:rPr lang="en-CA" dirty="0" smtClean="0"/>
+              <a:t>PRISM separates out instances that have already been covered</a:t>
+            </a:r>
+          </a:p>
+          <a:p>
+            <a:pPr lvl="1"/>
+            <a:r>
+              <a:rPr lang="en-CA" dirty="0" smtClean="0"/>
+              <a:t>Decision trees divide the instances based on information gain</a:t>
+            </a:r>
+            <a:endParaRPr lang="en-CA" dirty="0"/>
+          </a:p>
+        </p:txBody>
+      </p:sp>
+    </p:spTree>
+    <p:extLst>
+      <p:ext uri="{BB962C8B-B14F-4D97-AF65-F5344CB8AC3E}">
+        <p14:creationId xmlns:p14="http://schemas.microsoft.com/office/powerpoint/2010/main" val="264985785"/>
+      </p:ext>
+    </p:extLst>
+  </p:cSld>
+  <p:clrMapOvr>
+    <a:masterClrMapping/>
+  </p:clrMapOvr>
+  <p:timing>
+    <p:tnLst>
+      <p:par>
+        <p:cTn id="1" dur="indefinite" restart="never" nodeType="tmRoot"/>
+      </p:par>
+    </p:tnLst>
+  </p:timing>
+</p:sld>
+</file>
+
+<file path=ppt/slides/slide16.xml><?xml version="1.0" encoding="utf-8"?>
+<p:sld xmlns:a="http://schemas.openxmlformats.org/drawingml/2006/main" xmlns:r="http://schemas.openxmlformats.org/officeDocument/2006/relationships" xmlns:p="http://schemas.openxmlformats.org/presentationml/2006/main">
+  <p:cSld>
+    <p:spTree>
+      <p:nvGrpSpPr>
+        <p:cNvPr id="1" name=""/>
+        <p:cNvGrpSpPr/>
+        <p:nvPr/>
+      </p:nvGrpSpPr>
+      <p:grpSpPr>
+        <a:xfrm>
+          <a:off x="0" y="0"/>
+          <a:ext cx="0" cy="0"/>
+          <a:chOff x="0" y="0"/>
+          <a:chExt cx="0" cy="0"/>
+        </a:xfrm>
+      </p:grpSpPr>
+      <p:sp>
+        <p:nvSpPr>
+          <p:cNvPr id="2" name="Title 1"/>
+          <p:cNvSpPr>
+            <a:spLocks noGrp="1"/>
+          </p:cNvSpPr>
+          <p:nvPr>
+            <p:ph type="title"/>
+          </p:nvPr>
+        </p:nvSpPr>
+        <p:spPr/>
+        <p:txBody>
+          <a:bodyPr/>
+          <a:lstStyle/>
+          <a:p>
+            <a:r>
+              <a:rPr lang="en-CA" dirty="0" smtClean="0"/>
+              <a:t>Mining association rules </a:t>
+            </a:r>
+            <a:r>
+              <a:rPr lang="en-CA" dirty="0" err="1" smtClean="0"/>
+              <a:t>pg</a:t>
+            </a:r>
+            <a:r>
+              <a:rPr lang="en-CA" dirty="0" smtClean="0"/>
+              <a:t> 119</a:t>
+            </a:r>
+            <a:endParaRPr lang="en-CA" dirty="0"/>
+          </a:p>
+        </p:txBody>
+      </p:sp>
+      <p:sp>
+        <p:nvSpPr>
+          <p:cNvPr id="3" name="Content Placeholder 2"/>
+          <p:cNvSpPr>
+            <a:spLocks noGrp="1"/>
+          </p:cNvSpPr>
+          <p:nvPr>
+            <p:ph idx="1"/>
+          </p:nvPr>
+        </p:nvSpPr>
+        <p:spPr/>
+        <p:txBody>
+          <a:bodyPr/>
+          <a:lstStyle/>
+          <a:p>
+            <a:r>
+              <a:rPr lang="en-CA" dirty="0" smtClean="0"/>
+              <a:t>Association rules are like classification rules and can be found in the same way, using separate-and-conquer rule induction procedure for each possible expression that could occur on the right hand side</a:t>
+            </a:r>
+          </a:p>
+          <a:p>
+            <a:r>
+              <a:rPr lang="en-CA" dirty="0" smtClean="0"/>
+              <a:t>However, if we don’t limit the right hand side to a class, we would have to execute the rule induction procedure once for every possible combination of attributes, with every possible combination of values, on the right hand side.</a:t>
+            </a:r>
+          </a:p>
+          <a:p>
+            <a:r>
+              <a:rPr lang="en-CA" dirty="0" smtClean="0"/>
+              <a:t>Instead we capitalize on the fact we are only interested in association rules with high coverage, seeking combinations of attribute-value pairs with a </a:t>
+            </a:r>
+            <a:r>
+              <a:rPr lang="en-CA" dirty="0" err="1" smtClean="0"/>
+              <a:t>prespecified</a:t>
+            </a:r>
+            <a:r>
+              <a:rPr lang="en-CA" dirty="0" smtClean="0"/>
+              <a:t> minimum coverage or ‘frequent item sets’</a:t>
+            </a:r>
+            <a:endParaRPr lang="en-CA" dirty="0"/>
+          </a:p>
+        </p:txBody>
+      </p:sp>
+    </p:spTree>
+    <p:extLst>
+      <p:ext uri="{BB962C8B-B14F-4D97-AF65-F5344CB8AC3E}">
+        <p14:creationId xmlns:p14="http://schemas.microsoft.com/office/powerpoint/2010/main" val="1116282866"/>
+      </p:ext>
+    </p:extLst>
+  </p:cSld>
+  <p:clrMapOvr>
+    <a:masterClrMapping/>
+  </p:clrMapOvr>
+  <p:timing>
+    <p:tnLst>
+      <p:par>
+        <p:cTn id="1" dur="indefinite" restart="never" nodeType="tmRoot"/>
+      </p:par>
+    </p:tnLst>
+  </p:timing>
+</p:sld>
+</file>
+
+<file path=ppt/slides/slide17.xml><?xml version="1.0" encoding="utf-8"?>
+<p:sld xmlns:a="http://schemas.openxmlformats.org/drawingml/2006/main" xmlns:r="http://schemas.openxmlformats.org/officeDocument/2006/relationships" xmlns:p="http://schemas.openxmlformats.org/presentationml/2006/main">
+  <p:cSld>
+    <p:spTree>
+      <p:nvGrpSpPr>
+        <p:cNvPr id="1" name=""/>
+        <p:cNvGrpSpPr/>
+        <p:nvPr/>
+      </p:nvGrpSpPr>
+      <p:grpSpPr>
+        <a:xfrm>
+          <a:off x="0" y="0"/>
+          <a:ext cx="0" cy="0"/>
+          <a:chOff x="0" y="0"/>
+          <a:chExt cx="0" cy="0"/>
+        </a:xfrm>
+      </p:grpSpPr>
+      <p:sp>
+        <p:nvSpPr>
+          <p:cNvPr id="2" name="Title 1"/>
+          <p:cNvSpPr>
+            <a:spLocks noGrp="1"/>
+          </p:cNvSpPr>
+          <p:nvPr>
+            <p:ph type="title"/>
+          </p:nvPr>
+        </p:nvSpPr>
+        <p:spPr/>
+        <p:txBody>
+          <a:bodyPr/>
+          <a:lstStyle/>
+          <a:p>
+            <a:r>
+              <a:rPr lang="en-CA" dirty="0" smtClean="0"/>
+              <a:t>Item sets pg119</a:t>
+            </a:r>
+            <a:endParaRPr lang="en-CA" dirty="0"/>
+          </a:p>
+        </p:txBody>
+      </p:sp>
+      <p:sp>
+        <p:nvSpPr>
+          <p:cNvPr id="3" name="Content Placeholder 2"/>
+          <p:cNvSpPr>
+            <a:spLocks noGrp="1"/>
+          </p:cNvSpPr>
+          <p:nvPr>
+            <p:ph idx="1"/>
+          </p:nvPr>
+        </p:nvSpPr>
+        <p:spPr/>
+        <p:txBody>
+          <a:bodyPr/>
+          <a:lstStyle/>
+          <a:p>
+            <a:r>
+              <a:rPr lang="en-CA" dirty="0" smtClean="0"/>
+              <a:t>List the individual items (attribute-value pairs), then generate two-item sets by making pairs of one-item sets. Discard sets with &lt;min coverage, and generate 3 items sets from the remaining sets. Repeat.</a:t>
+            </a:r>
+          </a:p>
+          <a:p>
+            <a:r>
+              <a:rPr lang="en-CA" dirty="0" smtClean="0"/>
+              <a:t>Association rules: once all item sets with required coverage have been generated, the next step is to turn the item sets into a rule or set of rules with a </a:t>
+            </a:r>
+            <a:r>
+              <a:rPr lang="en-CA" dirty="0" err="1" smtClean="0"/>
+              <a:t>prespecified</a:t>
+            </a:r>
+            <a:r>
+              <a:rPr lang="en-CA" dirty="0" smtClean="0"/>
+              <a:t> minimum accuracy</a:t>
+            </a:r>
+          </a:p>
+          <a:p>
+            <a:r>
+              <a:rPr lang="en-CA" dirty="0" smtClean="0"/>
+              <a:t>A three item set with a coverage of 4: humidity=normal, windy=false, play=yes gives 7 potential rules</a:t>
+            </a:r>
+          </a:p>
+          <a:p>
+            <a:endParaRPr lang="en-CA" dirty="0" smtClean="0"/>
+          </a:p>
+          <a:p>
+            <a:endParaRPr lang="en-CA" dirty="0"/>
+          </a:p>
+        </p:txBody>
+      </p:sp>
+    </p:spTree>
+    <p:extLst>
+      <p:ext uri="{BB962C8B-B14F-4D97-AF65-F5344CB8AC3E}">
+        <p14:creationId xmlns:p14="http://schemas.microsoft.com/office/powerpoint/2010/main" val="4273175260"/>
+      </p:ext>
+    </p:extLst>
+  </p:cSld>
+  <p:clrMapOvr>
+    <a:masterClrMapping/>
+  </p:clrMapOvr>
+  <p:timing>
+    <p:tnLst>
+      <p:par>
+        <p:cTn id="1" dur="indefinite" restart="never" nodeType="tmRoot"/>
+      </p:par>
+    </p:tnLst>
+  </p:timing>
+</p:sld>
+</file>
+
+<file path=ppt/slides/slide18.xml><?xml version="1.0" encoding="utf-8"?>
+<p:sld xmlns:a="http://schemas.openxmlformats.org/drawingml/2006/main" xmlns:r="http://schemas.openxmlformats.org/officeDocument/2006/relationships" xmlns:p="http://schemas.openxmlformats.org/presentationml/2006/main">
+  <p:cSld>
+    <p:spTree>
+      <p:nvGrpSpPr>
+        <p:cNvPr id="1" name=""/>
+        <p:cNvGrpSpPr/>
+        <p:nvPr/>
+      </p:nvGrpSpPr>
+      <p:grpSpPr>
+        <a:xfrm>
+          <a:off x="0" y="0"/>
+          <a:ext cx="0" cy="0"/>
+          <a:chOff x="0" y="0"/>
+          <a:chExt cx="0" cy="0"/>
+        </a:xfrm>
+      </p:grpSpPr>
+      <p:sp>
+        <p:nvSpPr>
+          <p:cNvPr id="2" name="Title 1"/>
+          <p:cNvSpPr>
+            <a:spLocks noGrp="1"/>
+          </p:cNvSpPr>
+          <p:nvPr>
+            <p:ph type="title"/>
+          </p:nvPr>
+        </p:nvSpPr>
+        <p:spPr/>
+        <p:txBody>
+          <a:bodyPr/>
+          <a:lstStyle/>
+          <a:p>
+            <a:r>
+              <a:rPr lang="en-CA" dirty="0" smtClean="0"/>
+              <a:t>Generating rules efficiently pg122</a:t>
+            </a:r>
+            <a:endParaRPr lang="en-CA" dirty="0"/>
+          </a:p>
+        </p:txBody>
+      </p:sp>
+      <p:sp>
+        <p:nvSpPr>
+          <p:cNvPr id="3" name="Content Placeholder 2"/>
+          <p:cNvSpPr>
+            <a:spLocks noGrp="1"/>
+          </p:cNvSpPr>
+          <p:nvPr>
+            <p:ph idx="1"/>
+          </p:nvPr>
+        </p:nvSpPr>
+        <p:spPr/>
+        <p:txBody>
+          <a:bodyPr>
+            <a:normAutofit fontScale="92500" lnSpcReduction="20000"/>
+          </a:bodyPr>
+          <a:lstStyle/>
+          <a:p>
+            <a:r>
+              <a:rPr lang="en-CA" dirty="0" smtClean="0"/>
+              <a:t>Two steps: 1) generating item sets with specified minimum coverage  and 2) from each item set determining rules with specified minimum accuracy</a:t>
+            </a:r>
+          </a:p>
+          <a:p>
+            <a:r>
+              <a:rPr lang="en-CA" dirty="0" smtClean="0"/>
+              <a:t>1) generate all 1-item sets with specified minimum coverage, and then use this to generate 2-item, 3-item, </a:t>
+            </a:r>
+            <a:r>
+              <a:rPr lang="en-CA" dirty="0" err="1" smtClean="0"/>
+              <a:t>etc</a:t>
+            </a:r>
+            <a:r>
+              <a:rPr lang="en-CA" dirty="0" smtClean="0"/>
+              <a:t> sets. </a:t>
+            </a:r>
+          </a:p>
+          <a:p>
+            <a:r>
+              <a:rPr lang="en-CA" dirty="0" smtClean="0"/>
+              <a:t>Each operation involves a pass through the dataset to count the items in each set and store surviving item sets in a hash table</a:t>
+            </a:r>
+          </a:p>
+          <a:p>
+            <a:r>
+              <a:rPr lang="en-CA" dirty="0" smtClean="0"/>
+              <a:t>Example: suppose we have five 3-item sets: ABC, ABD, ACD, ACE, and BCD, where a is a feature such as outlook=sunny. </a:t>
+            </a:r>
+          </a:p>
+          <a:p>
+            <a:pPr lvl="1"/>
+            <a:r>
+              <a:rPr lang="en-CA" dirty="0" smtClean="0"/>
+              <a:t>Union of ABC, ABD = ABCD is a candidate 4-item set because its other 3-item sets ACD and BCD have &gt;min coverage. </a:t>
+            </a:r>
+          </a:p>
+          <a:p>
+            <a:pPr lvl="1"/>
+            <a:r>
+              <a:rPr lang="en-CA" dirty="0" smtClean="0"/>
+              <a:t>If the 3-item sets are sorted into lexical order, as they are here, we need only consider pairs whose first two members are the same. </a:t>
+            </a:r>
+          </a:p>
+          <a:p>
+            <a:pPr lvl="1"/>
+            <a:r>
+              <a:rPr lang="en-CA" dirty="0" smtClean="0"/>
+              <a:t>The hash table assists with the check, simply remove each item from the set in turn, and check that remaining 3-item set is indeed present in the hash table</a:t>
+            </a:r>
+            <a:endParaRPr lang="en-CA" dirty="0"/>
+          </a:p>
+        </p:txBody>
+      </p:sp>
+    </p:spTree>
+    <p:extLst>
+      <p:ext uri="{BB962C8B-B14F-4D97-AF65-F5344CB8AC3E}">
+        <p14:creationId xmlns:p14="http://schemas.microsoft.com/office/powerpoint/2010/main" val="1814884283"/>
+      </p:ext>
+    </p:extLst>
+  </p:cSld>
+  <p:clrMapOvr>
+    <a:masterClrMapping/>
+  </p:clrMapOvr>
+  <p:timing>
+    <p:tnLst>
+      <p:par>
+        <p:cTn id="1" dur="indefinite" restart="never" nodeType="tmRoot"/>
+      </p:par>
+    </p:tnLst>
+  </p:timing>
+</p:sld>
+</file>
+
+<file path=ppt/slides/slide19.xml><?xml version="1.0" encoding="utf-8"?>
+<p:sld xmlns:a="http://schemas.openxmlformats.org/drawingml/2006/main" xmlns:r="http://schemas.openxmlformats.org/officeDocument/2006/relationships" xmlns:p="http://schemas.openxmlformats.org/presentationml/2006/main">
+  <p:cSld>
+    <p:spTree>
+      <p:nvGrpSpPr>
+        <p:cNvPr id="1" name=""/>
+        <p:cNvGrpSpPr/>
+        <p:nvPr/>
+      </p:nvGrpSpPr>
+      <p:grpSpPr>
+        <a:xfrm>
+          <a:off x="0" y="0"/>
+          <a:ext cx="0" cy="0"/>
+          <a:chOff x="0" y="0"/>
+          <a:chExt cx="0" cy="0"/>
+        </a:xfrm>
+      </p:grpSpPr>
+      <p:sp>
+        <p:nvSpPr>
+          <p:cNvPr id="2" name="Title 1"/>
+          <p:cNvSpPr>
+            <a:spLocks noGrp="1"/>
+          </p:cNvSpPr>
+          <p:nvPr>
+            <p:ph type="title"/>
+          </p:nvPr>
+        </p:nvSpPr>
+        <p:spPr/>
+        <p:txBody>
+          <a:bodyPr/>
+          <a:lstStyle/>
+          <a:p>
+            <a:r>
+              <a:rPr lang="en-CA" dirty="0" smtClean="0"/>
+              <a:t>Generating rules efficiently 2 pg125</a:t>
+            </a:r>
+            <a:endParaRPr lang="en-CA" dirty="0"/>
+          </a:p>
+        </p:txBody>
+      </p:sp>
+      <p:sp>
+        <p:nvSpPr>
+          <p:cNvPr id="3" name="Content Placeholder 2"/>
+          <p:cNvSpPr>
+            <a:spLocks noGrp="1"/>
+          </p:cNvSpPr>
+          <p:nvPr>
+            <p:ph idx="1"/>
+          </p:nvPr>
+        </p:nvSpPr>
+        <p:spPr/>
+        <p:txBody>
+          <a:bodyPr/>
+          <a:lstStyle/>
+          <a:p>
+            <a:r>
+              <a:rPr lang="en-CA" dirty="0" smtClean="0"/>
+              <a:t>Take each item set and generate rules from it, checking that they have the minimum accuracy</a:t>
+            </a:r>
+          </a:p>
+          <a:p>
+            <a:r>
+              <a:rPr lang="en-CA" dirty="0" smtClean="0"/>
+              <a:t>Need to place each subset of n-item set as consequent, a brute force procedure that is computationally intensive, because number of possible subsets grows exponentially with size of set</a:t>
+            </a:r>
+          </a:p>
+          <a:p>
+            <a:r>
+              <a:rPr lang="en-CA" dirty="0" smtClean="0"/>
+              <a:t>A better way: if double consequent rule holds, then both single consequent rules must also hold, and, if one or the other single consequent rules does not hold the double consequent will not hold</a:t>
+            </a:r>
+          </a:p>
+          <a:p>
+            <a:pPr lvl="1"/>
+            <a:r>
+              <a:rPr lang="en-CA" dirty="0" smtClean="0"/>
+              <a:t>This gives a way of building up from single-consequent rules to candidate double consequent ones, from double to triple, etc.</a:t>
+            </a:r>
+            <a:endParaRPr lang="en-CA" dirty="0"/>
+          </a:p>
+        </p:txBody>
+      </p:sp>
+    </p:spTree>
+    <p:extLst>
+      <p:ext uri="{BB962C8B-B14F-4D97-AF65-F5344CB8AC3E}">
+        <p14:creationId xmlns:p14="http://schemas.microsoft.com/office/powerpoint/2010/main" val="3329110252"/>
+      </p:ext>
+    </p:extLst>
+  </p:cSld>
+  <p:clrMapOvr>
+    <a:masterClrMapping/>
+  </p:clrMapOvr>
+  <p:timing>
+    <p:tnLst>
+      <p:par>
+        <p:cTn id="1" dur="indefinite" restart="never" nodeType="tmRoot"/>
+      </p:par>
+    </p:tnLst>
+  </p:timing>
 </p:sld>
 </file>
 
@@ -3205,6 +4435,1265 @@
   <p:clrMapOvr>
     <a:masterClrMapping/>
   </p:clrMapOvr>
+  <p:timing>
+    <p:tnLst>
+      <p:par>
+        <p:cTn id="1" dur="indefinite" restart="never" nodeType="tmRoot"/>
+      </p:par>
+    </p:tnLst>
+  </p:timing>
+</p:sld>
+</file>
+
+<file path=ppt/slides/slide20.xml><?xml version="1.0" encoding="utf-8"?>
+<p:sld xmlns:a="http://schemas.openxmlformats.org/drawingml/2006/main" xmlns:r="http://schemas.openxmlformats.org/officeDocument/2006/relationships" xmlns:p="http://schemas.openxmlformats.org/presentationml/2006/main">
+  <p:cSld>
+    <p:spTree>
+      <p:nvGrpSpPr>
+        <p:cNvPr id="1" name=""/>
+        <p:cNvGrpSpPr/>
+        <p:nvPr/>
+      </p:nvGrpSpPr>
+      <p:grpSpPr>
+        <a:xfrm>
+          <a:off x="0" y="0"/>
+          <a:ext cx="0" cy="0"/>
+          <a:chOff x="0" y="0"/>
+          <a:chExt cx="0" cy="0"/>
+        </a:xfrm>
+      </p:grpSpPr>
+      <p:sp>
+        <p:nvSpPr>
+          <p:cNvPr id="2" name="Title 1"/>
+          <p:cNvSpPr>
+            <a:spLocks noGrp="1"/>
+          </p:cNvSpPr>
+          <p:nvPr>
+            <p:ph type="title"/>
+          </p:nvPr>
+        </p:nvSpPr>
+        <p:spPr/>
+        <p:txBody>
+          <a:bodyPr/>
+          <a:lstStyle/>
+          <a:p>
+            <a:r>
+              <a:rPr lang="en-CA" dirty="0" smtClean="0"/>
+              <a:t>Generating rules efficiently pseudocode pg126</a:t>
+            </a:r>
+            <a:endParaRPr lang="en-CA" dirty="0"/>
+          </a:p>
+        </p:txBody>
+      </p:sp>
+      <p:sp>
+        <p:nvSpPr>
+          <p:cNvPr id="3" name="Content Placeholder 2"/>
+          <p:cNvSpPr>
+            <a:spLocks noGrp="1"/>
+          </p:cNvSpPr>
+          <p:nvPr>
+            <p:ph idx="1"/>
+          </p:nvPr>
+        </p:nvSpPr>
+        <p:spPr/>
+        <p:txBody>
+          <a:bodyPr/>
+          <a:lstStyle/>
+          <a:p>
+            <a:r>
+              <a:rPr lang="en-CA" dirty="0" smtClean="0"/>
+              <a:t>Minimum coverage and accuracy set by the user</a:t>
+            </a:r>
+            <a:endParaRPr lang="en-CA" dirty="0"/>
+          </a:p>
+        </p:txBody>
+      </p:sp>
+    </p:spTree>
+    <p:extLst>
+      <p:ext uri="{BB962C8B-B14F-4D97-AF65-F5344CB8AC3E}">
+        <p14:creationId xmlns:p14="http://schemas.microsoft.com/office/powerpoint/2010/main" val="1903688608"/>
+      </p:ext>
+    </p:extLst>
+  </p:cSld>
+  <p:clrMapOvr>
+    <a:masterClrMapping/>
+  </p:clrMapOvr>
+  <p:timing>
+    <p:tnLst>
+      <p:par>
+        <p:cTn id="1" dur="indefinite" restart="never" nodeType="tmRoot"/>
+      </p:par>
+    </p:tnLst>
+  </p:timing>
+</p:sld>
+</file>
+
+<file path=ppt/slides/slide21.xml><?xml version="1.0" encoding="utf-8"?>
+<p:sld xmlns:a="http://schemas.openxmlformats.org/drawingml/2006/main" xmlns:r="http://schemas.openxmlformats.org/officeDocument/2006/relationships" xmlns:p="http://schemas.openxmlformats.org/presentationml/2006/main">
+  <p:cSld>
+    <p:spTree>
+      <p:nvGrpSpPr>
+        <p:cNvPr id="1" name=""/>
+        <p:cNvGrpSpPr/>
+        <p:nvPr/>
+      </p:nvGrpSpPr>
+      <p:grpSpPr>
+        <a:xfrm>
+          <a:off x="0" y="0"/>
+          <a:ext cx="0" cy="0"/>
+          <a:chOff x="0" y="0"/>
+          <a:chExt cx="0" cy="0"/>
+        </a:xfrm>
+      </p:grpSpPr>
+      <p:sp>
+        <p:nvSpPr>
+          <p:cNvPr id="3" name="Content Placeholder 2"/>
+          <p:cNvSpPr>
+            <a:spLocks noGrp="1"/>
+          </p:cNvSpPr>
+          <p:nvPr>
+            <p:ph idx="1"/>
+          </p:nvPr>
+        </p:nvSpPr>
+        <p:spPr/>
+        <p:txBody>
+          <a:bodyPr>
+            <a:normAutofit fontScale="92500"/>
+          </a:bodyPr>
+          <a:lstStyle/>
+          <a:p>
+            <a:r>
+              <a:rPr lang="en-CA" dirty="0" smtClean="0"/>
+              <a:t>Set K=1, coverage = C</a:t>
+            </a:r>
+            <a:r>
+              <a:rPr lang="en-CA" i="1" dirty="0" smtClean="0"/>
+              <a:t> //user defined</a:t>
+            </a:r>
+          </a:p>
+          <a:p>
+            <a:r>
+              <a:rPr lang="en-CA" dirty="0" smtClean="0"/>
+              <a:t>Find all k-item sets (attribute values) with (number of instances) &gt; C, add to #(K==1) </a:t>
+            </a:r>
+          </a:p>
+          <a:p>
+            <a:r>
+              <a:rPr lang="en-CA" dirty="0" smtClean="0"/>
+              <a:t>While there exist K-item sets with (number of instances) &gt; C,</a:t>
+            </a:r>
+          </a:p>
+          <a:p>
+            <a:pPr lvl="1"/>
+            <a:r>
+              <a:rPr lang="en-CA" dirty="0" smtClean="0"/>
+              <a:t>K=K+1</a:t>
+            </a:r>
+          </a:p>
+          <a:p>
+            <a:pPr lvl="1"/>
+            <a:r>
+              <a:rPr lang="en-CA" dirty="0" smtClean="0"/>
+              <a:t>For each pair of (K-1)-item sets in #(K-1) differing only in last item</a:t>
+            </a:r>
+          </a:p>
+          <a:p>
+            <a:pPr lvl="1"/>
+            <a:r>
+              <a:rPr lang="en-CA" dirty="0" smtClean="0"/>
+              <a:t>Create K-item set for each pair by combining the two (K-1)-item sets that are paired</a:t>
+            </a:r>
+          </a:p>
+          <a:p>
+            <a:pPr lvl="1"/>
+            <a:r>
+              <a:rPr lang="en-CA" dirty="0" smtClean="0"/>
+              <a:t>Remove all K-item sets that contain (K-1)-item sets not in #(K-1) </a:t>
+            </a:r>
+            <a:r>
+              <a:rPr lang="en-CA" i="1" dirty="0" smtClean="0"/>
+              <a:t>//subset coverage</a:t>
+            </a:r>
+          </a:p>
+          <a:p>
+            <a:pPr lvl="1"/>
+            <a:r>
+              <a:rPr lang="en-CA" dirty="0" smtClean="0"/>
+              <a:t>Remove all K-item sets that do not have sufficient coverage </a:t>
+            </a:r>
+            <a:r>
+              <a:rPr lang="en-CA" i="1" dirty="0" smtClean="0"/>
+              <a:t>//new set coverage</a:t>
+            </a:r>
+          </a:p>
+          <a:p>
+            <a:pPr lvl="1"/>
+            <a:r>
+              <a:rPr lang="en-CA" dirty="0" smtClean="0"/>
+              <a:t>Store remaining K-item sets and their coverage in #K, sorting sets in lexical order</a:t>
+            </a:r>
+            <a:endParaRPr lang="en-CA" dirty="0"/>
+          </a:p>
+          <a:p>
+            <a:endParaRPr lang="en-CA" dirty="0"/>
+          </a:p>
+        </p:txBody>
+      </p:sp>
+      <p:sp>
+        <p:nvSpPr>
+          <p:cNvPr id="4" name="Title 1"/>
+          <p:cNvSpPr txBox="1">
+            <a:spLocks/>
+          </p:cNvSpPr>
+          <p:nvPr/>
+        </p:nvSpPr>
+        <p:spPr>
+          <a:xfrm>
+            <a:off x="990600" y="517525"/>
+            <a:ext cx="10515600" cy="1325563"/>
+          </a:xfrm>
+          <a:prstGeom prst="rect">
+            <a:avLst/>
+          </a:prstGeom>
+        </p:spPr>
+        <p:txBody>
+          <a:bodyPr vert="horz" lIns="91440" tIns="45720" rIns="91440" bIns="45720" rtlCol="0" anchor="ctr">
+            <a:normAutofit/>
+          </a:bodyPr>
+          <a:lstStyle>
+            <a:lvl1pPr algn="l" defTabSz="914400" rtl="0" eaLnBrk="1" latinLnBrk="0" hangingPunct="1">
+              <a:lnSpc>
+                <a:spcPct val="90000"/>
+              </a:lnSpc>
+              <a:spcBef>
+                <a:spcPct val="0"/>
+              </a:spcBef>
+              <a:buNone/>
+              <a:defRPr sz="4400" kern="1200">
+                <a:solidFill>
+                  <a:schemeClr val="tx1"/>
+                </a:solidFill>
+                <a:latin typeface="+mj-lt"/>
+                <a:ea typeface="+mj-ea"/>
+                <a:cs typeface="+mj-cs"/>
+              </a:defRPr>
+            </a:lvl1pPr>
+          </a:lstStyle>
+          <a:p>
+            <a:r>
+              <a:rPr lang="en-CA" dirty="0" smtClean="0"/>
+              <a:t>Find all K-item sets with sufficient coverage pg126</a:t>
+            </a:r>
+            <a:endParaRPr lang="en-CA" dirty="0"/>
+          </a:p>
+        </p:txBody>
+      </p:sp>
+    </p:spTree>
+    <p:extLst>
+      <p:ext uri="{BB962C8B-B14F-4D97-AF65-F5344CB8AC3E}">
+        <p14:creationId xmlns:p14="http://schemas.microsoft.com/office/powerpoint/2010/main" val="2083684501"/>
+      </p:ext>
+    </p:extLst>
+  </p:cSld>
+  <p:clrMapOvr>
+    <a:masterClrMapping/>
+  </p:clrMapOvr>
+  <p:timing>
+    <p:tnLst>
+      <p:par>
+        <p:cTn id="1" dur="indefinite" restart="never" nodeType="tmRoot"/>
+      </p:par>
+    </p:tnLst>
+  </p:timing>
+</p:sld>
+</file>
+
+<file path=ppt/slides/slide22.xml><?xml version="1.0" encoding="utf-8"?>
+<p:sld xmlns:a="http://schemas.openxmlformats.org/drawingml/2006/main" xmlns:r="http://schemas.openxmlformats.org/officeDocument/2006/relationships" xmlns:p="http://schemas.openxmlformats.org/presentationml/2006/main">
+  <p:cSld>
+    <p:spTree>
+      <p:nvGrpSpPr>
+        <p:cNvPr id="1" name=""/>
+        <p:cNvGrpSpPr/>
+        <p:nvPr/>
+      </p:nvGrpSpPr>
+      <p:grpSpPr>
+        <a:xfrm>
+          <a:off x="0" y="0"/>
+          <a:ext cx="0" cy="0"/>
+          <a:chOff x="0" y="0"/>
+          <a:chExt cx="0" cy="0"/>
+        </a:xfrm>
+      </p:grpSpPr>
+      <p:sp>
+        <p:nvSpPr>
+          <p:cNvPr id="3" name="Content Placeholder 2"/>
+          <p:cNvSpPr>
+            <a:spLocks noGrp="1"/>
+          </p:cNvSpPr>
+          <p:nvPr>
+            <p:ph idx="1"/>
+          </p:nvPr>
+        </p:nvSpPr>
+        <p:spPr/>
+        <p:txBody>
+          <a:bodyPr>
+            <a:normAutofit fontScale="92500" lnSpcReduction="10000"/>
+          </a:bodyPr>
+          <a:lstStyle/>
+          <a:p>
+            <a:r>
+              <a:rPr lang="en-CA" dirty="0" smtClean="0"/>
+              <a:t>Set n=1, accuracy=a</a:t>
+            </a:r>
+          </a:p>
+          <a:p>
+            <a:r>
+              <a:rPr lang="en-CA" dirty="0" smtClean="0"/>
+              <a:t>Find all sufficiently accurate n-consequent rules for the k-item set and store in #1, computing accuracy using the hash tables found for the item sets</a:t>
+            </a:r>
+          </a:p>
+          <a:p>
+            <a:r>
+              <a:rPr lang="en-CA" dirty="0" smtClean="0"/>
+              <a:t>While there exist some sufficiently accurate n-consequent rules:</a:t>
+            </a:r>
+          </a:p>
+          <a:p>
+            <a:pPr lvl="1"/>
+            <a:r>
+              <a:rPr lang="en-CA" dirty="0" smtClean="0"/>
+              <a:t>n=n+1</a:t>
+            </a:r>
+          </a:p>
+          <a:p>
+            <a:pPr lvl="1"/>
+            <a:r>
+              <a:rPr lang="en-CA" dirty="0" smtClean="0"/>
+              <a:t>Find all pairs of (n-1)-consequent rules in #(n-1) whose consequents differ only in last item</a:t>
+            </a:r>
+          </a:p>
+          <a:p>
+            <a:pPr lvl="1"/>
+            <a:r>
+              <a:rPr lang="en-CA" dirty="0" smtClean="0"/>
+              <a:t>Create n-consequent rule for each pair by combining (n-1)-consequents</a:t>
+            </a:r>
+          </a:p>
+          <a:p>
+            <a:pPr lvl="1"/>
+            <a:r>
+              <a:rPr lang="en-CA" dirty="0" smtClean="0"/>
+              <a:t>Remove all n-consequent rules where accuracy&lt;a, computing accuracy using hash tables found for item sets</a:t>
+            </a:r>
+          </a:p>
+          <a:p>
+            <a:pPr lvl="1"/>
+            <a:r>
+              <a:rPr lang="en-CA" dirty="0" smtClean="0"/>
+              <a:t>Store remaining n-consequent rules and their accuracy in hash table #k, sorting items for each consequent in lexical order</a:t>
+            </a:r>
+          </a:p>
+          <a:p>
+            <a:pPr lvl="1"/>
+            <a:endParaRPr lang="en-CA" dirty="0" smtClean="0"/>
+          </a:p>
+        </p:txBody>
+      </p:sp>
+      <p:sp>
+        <p:nvSpPr>
+          <p:cNvPr id="5" name="Title 1"/>
+          <p:cNvSpPr txBox="1">
+            <a:spLocks/>
+          </p:cNvSpPr>
+          <p:nvPr/>
+        </p:nvSpPr>
+        <p:spPr>
+          <a:xfrm>
+            <a:off x="990600" y="517525"/>
+            <a:ext cx="10515600" cy="1325563"/>
+          </a:xfrm>
+          <a:prstGeom prst="rect">
+            <a:avLst/>
+          </a:prstGeom>
+        </p:spPr>
+        <p:txBody>
+          <a:bodyPr vert="horz" lIns="91440" tIns="45720" rIns="91440" bIns="45720" rtlCol="0" anchor="ctr">
+            <a:normAutofit/>
+          </a:bodyPr>
+          <a:lstStyle>
+            <a:lvl1pPr algn="l" defTabSz="914400" rtl="0" eaLnBrk="1" latinLnBrk="0" hangingPunct="1">
+              <a:lnSpc>
+                <a:spcPct val="90000"/>
+              </a:lnSpc>
+              <a:spcBef>
+                <a:spcPct val="0"/>
+              </a:spcBef>
+              <a:buNone/>
+              <a:defRPr sz="4400" kern="1200">
+                <a:solidFill>
+                  <a:schemeClr val="tx1"/>
+                </a:solidFill>
+                <a:latin typeface="+mj-lt"/>
+                <a:ea typeface="+mj-ea"/>
+                <a:cs typeface="+mj-cs"/>
+              </a:defRPr>
+            </a:lvl1pPr>
+          </a:lstStyle>
+          <a:p>
+            <a:r>
+              <a:rPr lang="en-CA" smtClean="0"/>
+              <a:t>Find all sufficiently accurate association rules for a k-item set pg126</a:t>
+            </a:r>
+            <a:endParaRPr lang="en-CA" dirty="0"/>
+          </a:p>
+        </p:txBody>
+      </p:sp>
+    </p:spTree>
+    <p:extLst>
+      <p:ext uri="{BB962C8B-B14F-4D97-AF65-F5344CB8AC3E}">
+        <p14:creationId xmlns:p14="http://schemas.microsoft.com/office/powerpoint/2010/main" val="1877542580"/>
+      </p:ext>
+    </p:extLst>
+  </p:cSld>
+  <p:clrMapOvr>
+    <a:masterClrMapping/>
+  </p:clrMapOvr>
+  <p:timing>
+    <p:tnLst>
+      <p:par>
+        <p:cTn id="1" dur="indefinite" restart="never" nodeType="tmRoot"/>
+      </p:par>
+    </p:tnLst>
+  </p:timing>
+</p:sld>
+</file>
+
+<file path=ppt/slides/slide23.xml><?xml version="1.0" encoding="utf-8"?>
+<p:sld xmlns:a="http://schemas.openxmlformats.org/drawingml/2006/main" xmlns:r="http://schemas.openxmlformats.org/officeDocument/2006/relationships" xmlns:p="http://schemas.openxmlformats.org/presentationml/2006/main">
+  <p:cSld>
+    <p:spTree>
+      <p:nvGrpSpPr>
+        <p:cNvPr id="1" name=""/>
+        <p:cNvGrpSpPr/>
+        <p:nvPr/>
+      </p:nvGrpSpPr>
+      <p:grpSpPr>
+        <a:xfrm>
+          <a:off x="0" y="0"/>
+          <a:ext cx="0" cy="0"/>
+          <a:chOff x="0" y="0"/>
+          <a:chExt cx="0" cy="0"/>
+        </a:xfrm>
+      </p:grpSpPr>
+      <p:sp>
+        <p:nvSpPr>
+          <p:cNvPr id="2" name="Title 1"/>
+          <p:cNvSpPr>
+            <a:spLocks noGrp="1"/>
+          </p:cNvSpPr>
+          <p:nvPr>
+            <p:ph type="title"/>
+          </p:nvPr>
+        </p:nvSpPr>
+        <p:spPr/>
+        <p:txBody>
+          <a:bodyPr/>
+          <a:lstStyle/>
+          <a:p>
+            <a:r>
+              <a:rPr lang="en-CA" dirty="0" smtClean="0"/>
+              <a:t>4.6 Linear Models pg127	</a:t>
+            </a:r>
+            <a:endParaRPr lang="en-CA" dirty="0"/>
+          </a:p>
+        </p:txBody>
+      </p:sp>
+      <p:sp>
+        <p:nvSpPr>
+          <p:cNvPr id="3" name="Content Placeholder 2"/>
+          <p:cNvSpPr>
+            <a:spLocks noGrp="1"/>
+          </p:cNvSpPr>
+          <p:nvPr>
+            <p:ph idx="1"/>
+          </p:nvPr>
+        </p:nvSpPr>
+        <p:spPr/>
+        <p:txBody>
+          <a:bodyPr/>
+          <a:lstStyle/>
+          <a:p>
+            <a:endParaRPr lang="en-CA"/>
+          </a:p>
+        </p:txBody>
+      </p:sp>
+    </p:spTree>
+    <p:extLst>
+      <p:ext uri="{BB962C8B-B14F-4D97-AF65-F5344CB8AC3E}">
+        <p14:creationId xmlns:p14="http://schemas.microsoft.com/office/powerpoint/2010/main" val="728885314"/>
+      </p:ext>
+    </p:extLst>
+  </p:cSld>
+  <p:clrMapOvr>
+    <a:masterClrMapping/>
+  </p:clrMapOvr>
+  <p:timing>
+    <p:tnLst>
+      <p:par>
+        <p:cTn id="1" dur="indefinite" restart="never" nodeType="tmRoot"/>
+      </p:par>
+    </p:tnLst>
+  </p:timing>
+</p:sld>
+</file>
+
+<file path=ppt/slides/slide24.xml><?xml version="1.0" encoding="utf-8"?>
+<p:sld xmlns:a="http://schemas.openxmlformats.org/drawingml/2006/main" xmlns:r="http://schemas.openxmlformats.org/officeDocument/2006/relationships" xmlns:p="http://schemas.openxmlformats.org/presentationml/2006/main">
+  <p:cSld>
+    <p:spTree>
+      <p:nvGrpSpPr>
+        <p:cNvPr id="1" name=""/>
+        <p:cNvGrpSpPr/>
+        <p:nvPr/>
+      </p:nvGrpSpPr>
+      <p:grpSpPr>
+        <a:xfrm>
+          <a:off x="0" y="0"/>
+          <a:ext cx="0" cy="0"/>
+          <a:chOff x="0" y="0"/>
+          <a:chExt cx="0" cy="0"/>
+        </a:xfrm>
+      </p:grpSpPr>
+      <p:sp>
+        <p:nvSpPr>
+          <p:cNvPr id="2" name="Title 1"/>
+          <p:cNvSpPr>
+            <a:spLocks noGrp="1"/>
+          </p:cNvSpPr>
+          <p:nvPr>
+            <p:ph type="title"/>
+          </p:nvPr>
+        </p:nvSpPr>
+        <p:spPr/>
+        <p:txBody>
+          <a:bodyPr/>
+          <a:lstStyle/>
+          <a:p>
+            <a:r>
+              <a:rPr lang="en-CA" dirty="0" smtClean="0"/>
+              <a:t>Linear Models</a:t>
+            </a:r>
+            <a:endParaRPr lang="en-CA" dirty="0"/>
+          </a:p>
+        </p:txBody>
+      </p:sp>
+      <p:sp>
+        <p:nvSpPr>
+          <p:cNvPr id="3" name="Content Placeholder 2"/>
+          <p:cNvSpPr>
+            <a:spLocks noGrp="1"/>
+          </p:cNvSpPr>
+          <p:nvPr>
+            <p:ph idx="1"/>
+          </p:nvPr>
+        </p:nvSpPr>
+        <p:spPr/>
+        <p:txBody>
+          <a:bodyPr/>
+          <a:lstStyle/>
+          <a:p>
+            <a:r>
+              <a:rPr lang="en-CA" dirty="0" smtClean="0"/>
+              <a:t>Methods previously considered (decision trees, rules) worked naturally with nominal values</a:t>
+            </a:r>
+          </a:p>
+          <a:p>
+            <a:r>
+              <a:rPr lang="en-CA" dirty="0" smtClean="0"/>
+              <a:t>There are methods that work more naturally with numerical values</a:t>
+            </a:r>
+            <a:endParaRPr lang="en-CA" dirty="0"/>
+          </a:p>
+        </p:txBody>
+      </p:sp>
+    </p:spTree>
+    <p:extLst>
+      <p:ext uri="{BB962C8B-B14F-4D97-AF65-F5344CB8AC3E}">
+        <p14:creationId xmlns:p14="http://schemas.microsoft.com/office/powerpoint/2010/main" val="4188975745"/>
+      </p:ext>
+    </p:extLst>
+  </p:cSld>
+  <p:clrMapOvr>
+    <a:masterClrMapping/>
+  </p:clrMapOvr>
+  <p:timing>
+    <p:tnLst>
+      <p:par>
+        <p:cTn id="1" dur="indefinite" restart="never" nodeType="tmRoot"/>
+      </p:par>
+    </p:tnLst>
+  </p:timing>
+</p:sld>
+</file>
+
+<file path=ppt/slides/slide25.xml><?xml version="1.0" encoding="utf-8"?>
+<p:sld xmlns:a="http://schemas.openxmlformats.org/drawingml/2006/main" xmlns:r="http://schemas.openxmlformats.org/officeDocument/2006/relationships" xmlns:p="http://schemas.openxmlformats.org/presentationml/2006/main">
+  <p:cSld>
+    <p:spTree>
+      <p:nvGrpSpPr>
+        <p:cNvPr id="1" name=""/>
+        <p:cNvGrpSpPr/>
+        <p:nvPr/>
+      </p:nvGrpSpPr>
+      <p:grpSpPr>
+        <a:xfrm>
+          <a:off x="0" y="0"/>
+          <a:ext cx="0" cy="0"/>
+          <a:chOff x="0" y="0"/>
+          <a:chExt cx="0" cy="0"/>
+        </a:xfrm>
+      </p:grpSpPr>
+      <p:sp>
+        <p:nvSpPr>
+          <p:cNvPr id="2" name="Title 1"/>
+          <p:cNvSpPr>
+            <a:spLocks noGrp="1"/>
+          </p:cNvSpPr>
+          <p:nvPr>
+            <p:ph type="title"/>
+          </p:nvPr>
+        </p:nvSpPr>
+        <p:spPr/>
+        <p:txBody>
+          <a:bodyPr/>
+          <a:lstStyle/>
+          <a:p>
+            <a:r>
+              <a:rPr lang="en-CA" dirty="0" smtClean="0"/>
+              <a:t>Numeric Prediction: Linear Regression pg127</a:t>
+            </a:r>
+            <a:endParaRPr lang="en-CA" dirty="0"/>
+          </a:p>
+        </p:txBody>
+      </p:sp>
+      <p:sp>
+        <p:nvSpPr>
+          <p:cNvPr id="3" name="Content Placeholder 2"/>
+          <p:cNvSpPr>
+            <a:spLocks noGrp="1"/>
+          </p:cNvSpPr>
+          <p:nvPr>
+            <p:ph idx="1"/>
+          </p:nvPr>
+        </p:nvSpPr>
+        <p:spPr/>
+        <p:txBody>
+          <a:bodyPr/>
+          <a:lstStyle/>
+          <a:p>
+            <a:r>
+              <a:rPr lang="en-CA" dirty="0" smtClean="0"/>
+              <a:t>Common in statistics</a:t>
+            </a:r>
+          </a:p>
+          <a:p>
+            <a:r>
+              <a:rPr lang="en-CA" dirty="0" smtClean="0"/>
+              <a:t>Express class as a linear combination of attributes using predetermined </a:t>
+            </a:r>
+            <a:r>
+              <a:rPr lang="en-CA" i="1" dirty="0" smtClean="0"/>
+              <a:t>weights</a:t>
+            </a:r>
+          </a:p>
+          <a:p>
+            <a:r>
+              <a:rPr lang="en-CA" dirty="0" smtClean="0"/>
+              <a:t>x=w0 + w1a1 + w2a2 + … + </a:t>
+            </a:r>
+            <a:r>
+              <a:rPr lang="en-CA" dirty="0" err="1" smtClean="0"/>
+              <a:t>wkak</a:t>
+            </a:r>
+            <a:endParaRPr lang="en-CA" dirty="0" smtClean="0"/>
+          </a:p>
+          <a:p>
+            <a:r>
+              <a:rPr lang="en-CA" dirty="0" smtClean="0"/>
+              <a:t>Where x is the class, a the attribute values, and w the weights</a:t>
+            </a:r>
+          </a:p>
+          <a:p>
+            <a:r>
+              <a:rPr lang="en-CA" dirty="0" smtClean="0"/>
+              <a:t>Weights are calculated from training data</a:t>
+            </a:r>
+          </a:p>
+          <a:p>
+            <a:r>
+              <a:rPr lang="en-CA" dirty="0" smtClean="0"/>
+              <a:t>Consider class x(1), its predicted value is </a:t>
+            </a:r>
+          </a:p>
+          <a:p>
+            <a:r>
+              <a:rPr lang="en-CA" dirty="0" smtClean="0"/>
+              <a:t>x(1) = w0a0(1) + w1a1(1) + … + </a:t>
+            </a:r>
+            <a:r>
+              <a:rPr lang="en-CA" dirty="0" err="1" smtClean="0"/>
+              <a:t>wkak</a:t>
+            </a:r>
+            <a:r>
+              <a:rPr lang="en-CA" dirty="0" smtClean="0"/>
+              <a:t>(1)</a:t>
+            </a:r>
+          </a:p>
+        </p:txBody>
+      </p:sp>
+    </p:spTree>
+    <p:extLst>
+      <p:ext uri="{BB962C8B-B14F-4D97-AF65-F5344CB8AC3E}">
+        <p14:creationId xmlns:p14="http://schemas.microsoft.com/office/powerpoint/2010/main" val="3778380586"/>
+      </p:ext>
+    </p:extLst>
+  </p:cSld>
+  <p:clrMapOvr>
+    <a:masterClrMapping/>
+  </p:clrMapOvr>
+  <p:timing>
+    <p:tnLst>
+      <p:par>
+        <p:cTn id="1" dur="indefinite" restart="never" nodeType="tmRoot"/>
+      </p:par>
+    </p:tnLst>
+  </p:timing>
+</p:sld>
+</file>
+
+<file path=ppt/slides/slide26.xml><?xml version="1.0" encoding="utf-8"?>
+<p:sld xmlns:a="http://schemas.openxmlformats.org/drawingml/2006/main" xmlns:r="http://schemas.openxmlformats.org/officeDocument/2006/relationships" xmlns:p="http://schemas.openxmlformats.org/presentationml/2006/main">
+  <p:cSld>
+    <p:spTree>
+      <p:nvGrpSpPr>
+        <p:cNvPr id="1" name=""/>
+        <p:cNvGrpSpPr/>
+        <p:nvPr/>
+      </p:nvGrpSpPr>
+      <p:grpSpPr>
+        <a:xfrm>
+          <a:off x="0" y="0"/>
+          <a:ext cx="0" cy="0"/>
+          <a:chOff x="0" y="0"/>
+          <a:chExt cx="0" cy="0"/>
+        </a:xfrm>
+      </p:grpSpPr>
+      <p:sp>
+        <p:nvSpPr>
+          <p:cNvPr id="2" name="Title 1"/>
+          <p:cNvSpPr>
+            <a:spLocks noGrp="1"/>
+          </p:cNvSpPr>
+          <p:nvPr>
+            <p:ph type="title"/>
+          </p:nvPr>
+        </p:nvSpPr>
+        <p:spPr/>
+        <p:txBody>
+          <a:bodyPr/>
+          <a:lstStyle/>
+          <a:p>
+            <a:r>
+              <a:rPr lang="en-CA" dirty="0" smtClean="0"/>
+              <a:t>Least square regression pg128</a:t>
+            </a:r>
+            <a:endParaRPr lang="en-CA" dirty="0"/>
+          </a:p>
+        </p:txBody>
+      </p:sp>
+      <p:sp>
+        <p:nvSpPr>
+          <p:cNvPr id="3" name="Content Placeholder 2"/>
+          <p:cNvSpPr>
+            <a:spLocks noGrp="1"/>
+          </p:cNvSpPr>
+          <p:nvPr>
+            <p:ph idx="1"/>
+          </p:nvPr>
+        </p:nvSpPr>
+        <p:spPr/>
+        <p:txBody>
+          <a:bodyPr/>
+          <a:lstStyle/>
+          <a:p>
+            <a:r>
+              <a:rPr lang="en-CA" dirty="0" smtClean="0"/>
+              <a:t>Choose weights </a:t>
+            </a:r>
+            <a:r>
+              <a:rPr lang="en-CA" dirty="0" err="1" smtClean="0"/>
+              <a:t>wk</a:t>
+            </a:r>
+            <a:r>
+              <a:rPr lang="en-CA" dirty="0" smtClean="0"/>
+              <a:t> to minimize sum of square of differences across all training instances</a:t>
+            </a:r>
+          </a:p>
+          <a:p>
+            <a:r>
+              <a:rPr lang="en-CA" dirty="0" smtClean="0"/>
+              <a:t>Consider n training instances, then sum of square of differences is:</a:t>
+            </a:r>
+          </a:p>
+          <a:p>
+            <a:r>
+              <a:rPr lang="en-CA" dirty="0" smtClean="0"/>
+              <a:t>Formula pg128</a:t>
+            </a:r>
+          </a:p>
+          <a:p>
+            <a:r>
+              <a:rPr lang="en-CA" dirty="0" smtClean="0"/>
+              <a:t>Matrix inversion formula</a:t>
+            </a:r>
+          </a:p>
+          <a:p>
+            <a:r>
+              <a:rPr lang="en-CA" dirty="0" smtClean="0"/>
+              <a:t>Interpreting weight matrix </a:t>
+            </a:r>
+            <a:r>
+              <a:rPr lang="en-CA" dirty="0" err="1" smtClean="0"/>
+              <a:t>neuroimage</a:t>
+            </a:r>
+            <a:r>
+              <a:rPr lang="en-CA" dirty="0" smtClean="0"/>
+              <a:t> best paper award</a:t>
+            </a:r>
+          </a:p>
+          <a:p>
+            <a:r>
+              <a:rPr lang="en-CA" dirty="0" smtClean="0"/>
+              <a:t>Result of least square regression is a set of numeric weights which can be used to predict the class of the next instance</a:t>
+            </a:r>
+          </a:p>
+          <a:p>
+            <a:endParaRPr lang="en-CA" dirty="0"/>
+          </a:p>
+        </p:txBody>
+      </p:sp>
+    </p:spTree>
+    <p:extLst>
+      <p:ext uri="{BB962C8B-B14F-4D97-AF65-F5344CB8AC3E}">
+        <p14:creationId xmlns:p14="http://schemas.microsoft.com/office/powerpoint/2010/main" val="3964761504"/>
+      </p:ext>
+    </p:extLst>
+  </p:cSld>
+  <p:clrMapOvr>
+    <a:masterClrMapping/>
+  </p:clrMapOvr>
+  <p:timing>
+    <p:tnLst>
+      <p:par>
+        <p:cTn id="1" dur="indefinite" restart="never" nodeType="tmRoot"/>
+      </p:par>
+    </p:tnLst>
+  </p:timing>
+</p:sld>
+</file>
+
+<file path=ppt/slides/slide27.xml><?xml version="1.0" encoding="utf-8"?>
+<p:sld xmlns:a="http://schemas.openxmlformats.org/drawingml/2006/main" xmlns:r="http://schemas.openxmlformats.org/officeDocument/2006/relationships" xmlns:p="http://schemas.openxmlformats.org/presentationml/2006/main">
+  <p:cSld>
+    <p:spTree>
+      <p:nvGrpSpPr>
+        <p:cNvPr id="1" name=""/>
+        <p:cNvGrpSpPr/>
+        <p:nvPr/>
+      </p:nvGrpSpPr>
+      <p:grpSpPr>
+        <a:xfrm>
+          <a:off x="0" y="0"/>
+          <a:ext cx="0" cy="0"/>
+          <a:chOff x="0" y="0"/>
+          <a:chExt cx="0" cy="0"/>
+        </a:xfrm>
+      </p:grpSpPr>
+      <p:sp>
+        <p:nvSpPr>
+          <p:cNvPr id="2" name="Title 1"/>
+          <p:cNvSpPr>
+            <a:spLocks noGrp="1"/>
+          </p:cNvSpPr>
+          <p:nvPr>
+            <p:ph type="title"/>
+          </p:nvPr>
+        </p:nvSpPr>
+        <p:spPr/>
+        <p:txBody>
+          <a:bodyPr/>
+          <a:lstStyle/>
+          <a:p>
+            <a:r>
+              <a:rPr lang="en-CA" dirty="0" smtClean="0"/>
+              <a:t>Example: CPU test performance pg129</a:t>
+            </a:r>
+            <a:endParaRPr lang="en-CA" dirty="0"/>
+          </a:p>
+        </p:txBody>
+      </p:sp>
+      <p:sp>
+        <p:nvSpPr>
+          <p:cNvPr id="3" name="Content Placeholder 2"/>
+          <p:cNvSpPr>
+            <a:spLocks noGrp="1"/>
+          </p:cNvSpPr>
+          <p:nvPr>
+            <p:ph idx="1"/>
+          </p:nvPr>
+        </p:nvSpPr>
+        <p:spPr/>
+        <p:txBody>
+          <a:bodyPr/>
+          <a:lstStyle/>
+          <a:p>
+            <a:endParaRPr lang="en-CA"/>
+          </a:p>
+        </p:txBody>
+      </p:sp>
+    </p:spTree>
+    <p:extLst>
+      <p:ext uri="{BB962C8B-B14F-4D97-AF65-F5344CB8AC3E}">
+        <p14:creationId xmlns:p14="http://schemas.microsoft.com/office/powerpoint/2010/main" val="4045142245"/>
+      </p:ext>
+    </p:extLst>
+  </p:cSld>
+  <p:clrMapOvr>
+    <a:masterClrMapping/>
+  </p:clrMapOvr>
+  <p:timing>
+    <p:tnLst>
+      <p:par>
+        <p:cTn id="1" dur="indefinite" restart="never" nodeType="tmRoot"/>
+      </p:par>
+    </p:tnLst>
+  </p:timing>
+</p:sld>
+</file>
+
+<file path=ppt/slides/slide28.xml><?xml version="1.0" encoding="utf-8"?>
+<p:sld xmlns:a="http://schemas.openxmlformats.org/drawingml/2006/main" xmlns:r="http://schemas.openxmlformats.org/officeDocument/2006/relationships" xmlns:p="http://schemas.openxmlformats.org/presentationml/2006/main">
+  <p:cSld>
+    <p:spTree>
+      <p:nvGrpSpPr>
+        <p:cNvPr id="1" name=""/>
+        <p:cNvGrpSpPr/>
+        <p:nvPr/>
+      </p:nvGrpSpPr>
+      <p:grpSpPr>
+        <a:xfrm>
+          <a:off x="0" y="0"/>
+          <a:ext cx="0" cy="0"/>
+          <a:chOff x="0" y="0"/>
+          <a:chExt cx="0" cy="0"/>
+        </a:xfrm>
+      </p:grpSpPr>
+      <p:sp>
+        <p:nvSpPr>
+          <p:cNvPr id="2" name="Title 1"/>
+          <p:cNvSpPr>
+            <a:spLocks noGrp="1"/>
+          </p:cNvSpPr>
+          <p:nvPr>
+            <p:ph type="title"/>
+          </p:nvPr>
+        </p:nvSpPr>
+        <p:spPr/>
+        <p:txBody>
+          <a:bodyPr/>
+          <a:lstStyle/>
+          <a:p>
+            <a:r>
+              <a:rPr lang="en-CA" dirty="0" err="1" smtClean="0"/>
+              <a:t>Multiresponse</a:t>
+            </a:r>
+            <a:r>
+              <a:rPr lang="en-CA" dirty="0" smtClean="0"/>
+              <a:t> linear regression pg129</a:t>
+            </a:r>
+            <a:endParaRPr lang="en-CA" dirty="0"/>
+          </a:p>
+        </p:txBody>
+      </p:sp>
+      <p:sp>
+        <p:nvSpPr>
+          <p:cNvPr id="3" name="Content Placeholder 2"/>
+          <p:cNvSpPr>
+            <a:spLocks noGrp="1"/>
+          </p:cNvSpPr>
+          <p:nvPr>
+            <p:ph idx="1"/>
+          </p:nvPr>
+        </p:nvSpPr>
+        <p:spPr/>
+        <p:txBody>
+          <a:bodyPr>
+            <a:normAutofit fontScale="92500" lnSpcReduction="20000"/>
+          </a:bodyPr>
+          <a:lstStyle/>
+          <a:p>
+            <a:r>
+              <a:rPr lang="en-CA" dirty="0" smtClean="0"/>
+              <a:t>Perform a regression for each class</a:t>
+            </a:r>
+          </a:p>
+          <a:p>
+            <a:r>
+              <a:rPr lang="en-CA" dirty="0" err="1" smtClean="0"/>
+              <a:t>Multiresponse</a:t>
+            </a:r>
+            <a:r>
+              <a:rPr lang="en-CA" dirty="0" smtClean="0"/>
+              <a:t> linear regression – perform a regression for each class, setting the output=1 for instances that are part of the class and output=0 for those that are not</a:t>
+            </a:r>
+          </a:p>
+          <a:p>
+            <a:pPr lvl="1"/>
+            <a:r>
+              <a:rPr lang="en-CA" dirty="0" smtClean="0"/>
+              <a:t>The result is a linear expression for the class</a:t>
+            </a:r>
+          </a:p>
+          <a:p>
+            <a:r>
+              <a:rPr lang="en-CA" dirty="0" smtClean="0"/>
+              <a:t>Then given a test example, calculate the value of the linear expression for each class and choose the largest</a:t>
+            </a:r>
+          </a:p>
+          <a:p>
+            <a:r>
+              <a:rPr lang="en-CA" dirty="0" smtClean="0"/>
+              <a:t>Look at it as approximating a numeric </a:t>
+            </a:r>
+            <a:r>
+              <a:rPr lang="en-CA" i="1" dirty="0" smtClean="0"/>
+              <a:t>membership function </a:t>
+            </a:r>
+            <a:r>
+              <a:rPr lang="en-CA" dirty="0" smtClean="0"/>
+              <a:t>for each class</a:t>
+            </a:r>
+          </a:p>
+          <a:p>
+            <a:r>
+              <a:rPr lang="en-CA" dirty="0" smtClean="0"/>
+              <a:t>Drawbacks</a:t>
+            </a:r>
+          </a:p>
+          <a:p>
+            <a:pPr lvl="1"/>
+            <a:r>
+              <a:rPr lang="en-CA" dirty="0" smtClean="0"/>
+              <a:t>1) does not give probabilities</a:t>
+            </a:r>
+          </a:p>
+          <a:p>
+            <a:pPr lvl="1"/>
+            <a:r>
+              <a:rPr lang="en-CA" dirty="0" smtClean="0"/>
+              <a:t>2) LSR assumes errors are statistically independent and normally distributed with the same </a:t>
+            </a:r>
+            <a:r>
+              <a:rPr lang="en-CA" dirty="0" err="1" smtClean="0"/>
+              <a:t>std</a:t>
+            </a:r>
+            <a:r>
+              <a:rPr lang="en-CA" dirty="0" smtClean="0"/>
+              <a:t>, an assumption violated in classification problems because observations are only ever 0 or 1</a:t>
+            </a:r>
+            <a:endParaRPr lang="en-CA" dirty="0"/>
+          </a:p>
+        </p:txBody>
+      </p:sp>
+    </p:spTree>
+    <p:extLst>
+      <p:ext uri="{BB962C8B-B14F-4D97-AF65-F5344CB8AC3E}">
+        <p14:creationId xmlns:p14="http://schemas.microsoft.com/office/powerpoint/2010/main" val="1718167042"/>
+      </p:ext>
+    </p:extLst>
+  </p:cSld>
+  <p:clrMapOvr>
+    <a:masterClrMapping/>
+  </p:clrMapOvr>
+  <p:timing>
+    <p:tnLst>
+      <p:par>
+        <p:cTn id="1" dur="indefinite" restart="never" nodeType="tmRoot"/>
+      </p:par>
+    </p:tnLst>
+  </p:timing>
+</p:sld>
+</file>
+
+<file path=ppt/slides/slide29.xml><?xml version="1.0" encoding="utf-8"?>
+<p:sld xmlns:a="http://schemas.openxmlformats.org/drawingml/2006/main" xmlns:r="http://schemas.openxmlformats.org/officeDocument/2006/relationships" xmlns:p="http://schemas.openxmlformats.org/presentationml/2006/main">
+  <p:cSld>
+    <p:spTree>
+      <p:nvGrpSpPr>
+        <p:cNvPr id="1" name=""/>
+        <p:cNvGrpSpPr/>
+        <p:nvPr/>
+      </p:nvGrpSpPr>
+      <p:grpSpPr>
+        <a:xfrm>
+          <a:off x="0" y="0"/>
+          <a:ext cx="0" cy="0"/>
+          <a:chOff x="0" y="0"/>
+          <a:chExt cx="0" cy="0"/>
+        </a:xfrm>
+      </p:grpSpPr>
+      <p:sp>
+        <p:nvSpPr>
+          <p:cNvPr id="2" name="Title 1"/>
+          <p:cNvSpPr>
+            <a:spLocks noGrp="1"/>
+          </p:cNvSpPr>
+          <p:nvPr>
+            <p:ph type="title"/>
+          </p:nvPr>
+        </p:nvSpPr>
+        <p:spPr/>
+        <p:txBody>
+          <a:bodyPr/>
+          <a:lstStyle/>
+          <a:p>
+            <a:r>
+              <a:rPr lang="en-CA" dirty="0" smtClean="0"/>
+              <a:t>Logistic Regression pg129</a:t>
+            </a:r>
+            <a:endParaRPr lang="en-CA" dirty="0"/>
+          </a:p>
+        </p:txBody>
+      </p:sp>
+      <p:sp>
+        <p:nvSpPr>
+          <p:cNvPr id="3" name="Content Placeholder 2"/>
+          <p:cNvSpPr>
+            <a:spLocks noGrp="1"/>
+          </p:cNvSpPr>
+          <p:nvPr>
+            <p:ph idx="1"/>
+          </p:nvPr>
+        </p:nvSpPr>
+        <p:spPr/>
+        <p:txBody>
+          <a:bodyPr/>
+          <a:lstStyle/>
+          <a:p>
+            <a:r>
+              <a:rPr lang="en-CA" dirty="0" smtClean="0"/>
+              <a:t>Instead of approximating 0 and 1 values directly, logistic regression builds a linear model based on a transformed target variable</a:t>
+            </a:r>
+          </a:p>
+          <a:p>
+            <a:r>
+              <a:rPr lang="en-CA" dirty="0" smtClean="0"/>
+              <a:t>Consider a 2-class problem (0/1) </a:t>
+            </a:r>
+          </a:p>
+          <a:p>
+            <a:r>
+              <a:rPr lang="en-CA" dirty="0" smtClean="0"/>
+              <a:t>We want to know p(1 | a1,a2,…</a:t>
+            </a:r>
+            <a:r>
+              <a:rPr lang="en-CA" dirty="0" err="1" smtClean="0"/>
+              <a:t>ak</a:t>
+            </a:r>
+            <a:r>
+              <a:rPr lang="en-CA" dirty="0" smtClean="0"/>
+              <a:t>) (target variable)</a:t>
+            </a:r>
+          </a:p>
+          <a:p>
+            <a:r>
+              <a:rPr lang="en-CA" dirty="0" smtClean="0"/>
+              <a:t>Logistic regression replaces target variable with</a:t>
+            </a:r>
+          </a:p>
+          <a:p>
+            <a:r>
+              <a:rPr lang="en-CA" dirty="0" smtClean="0"/>
+              <a:t>Log(p(1|a1,a2,…</a:t>
+            </a:r>
+            <a:r>
+              <a:rPr lang="en-CA" dirty="0" err="1" smtClean="0"/>
+              <a:t>ak</a:t>
+            </a:r>
+            <a:r>
+              <a:rPr lang="en-CA" dirty="0" smtClean="0"/>
+              <a:t>))/(1-p(1|a1,a2,…</a:t>
+            </a:r>
+            <a:r>
+              <a:rPr lang="en-CA" dirty="0" err="1" smtClean="0"/>
+              <a:t>ak</a:t>
+            </a:r>
+            <a:r>
+              <a:rPr lang="en-CA" dirty="0" smtClean="0"/>
+              <a:t>)) </a:t>
+            </a:r>
+          </a:p>
+          <a:p>
+            <a:r>
+              <a:rPr lang="en-CA" dirty="0" smtClean="0"/>
+              <a:t>Figure 4.1a the logit transformation</a:t>
+            </a:r>
+          </a:p>
+          <a:p>
+            <a:r>
+              <a:rPr lang="en-CA" dirty="0" smtClean="0"/>
+              <a:t>Resulting model is p(a1|a1,a2,…</a:t>
+            </a:r>
+            <a:r>
+              <a:rPr lang="en-CA" dirty="0" err="1" smtClean="0"/>
+              <a:t>ak</a:t>
+            </a:r>
+            <a:r>
+              <a:rPr lang="en-CA" dirty="0" smtClean="0"/>
+              <a:t>) = 1/(1+exp(-w0-w1a1-…-</a:t>
+            </a:r>
+            <a:r>
+              <a:rPr lang="en-CA" dirty="0" err="1" smtClean="0"/>
+              <a:t>wkak</a:t>
+            </a:r>
+            <a:r>
+              <a:rPr lang="en-CA" dirty="0" smtClean="0"/>
+              <a:t>))</a:t>
+            </a:r>
+          </a:p>
+          <a:p>
+            <a:endParaRPr lang="en-CA" dirty="0"/>
+          </a:p>
+        </p:txBody>
+      </p:sp>
+    </p:spTree>
+    <p:extLst>
+      <p:ext uri="{BB962C8B-B14F-4D97-AF65-F5344CB8AC3E}">
+        <p14:creationId xmlns:p14="http://schemas.microsoft.com/office/powerpoint/2010/main" val="1988664033"/>
+      </p:ext>
+    </p:extLst>
+  </p:cSld>
+  <p:clrMapOvr>
+    <a:masterClrMapping/>
+  </p:clrMapOvr>
+  <p:timing>
+    <p:tnLst>
+      <p:par>
+        <p:cTn id="1" dur="indefinite" restart="never" nodeType="tmRoot"/>
+      </p:par>
+    </p:tnLst>
+  </p:timing>
 </p:sld>
 </file>
 
@@ -3287,6 +5776,1475 @@
   <p:clrMapOvr>
     <a:masterClrMapping/>
   </p:clrMapOvr>
+  <p:timing>
+    <p:tnLst>
+      <p:par>
+        <p:cTn id="1" dur="indefinite" restart="never" nodeType="tmRoot"/>
+      </p:par>
+    </p:tnLst>
+  </p:timing>
+</p:sld>
+</file>
+
+<file path=ppt/slides/slide30.xml><?xml version="1.0" encoding="utf-8"?>
+<p:sld xmlns:a="http://schemas.openxmlformats.org/drawingml/2006/main" xmlns:r="http://schemas.openxmlformats.org/officeDocument/2006/relationships" xmlns:p="http://schemas.openxmlformats.org/presentationml/2006/main">
+  <p:cSld>
+    <p:spTree>
+      <p:nvGrpSpPr>
+        <p:cNvPr id="1" name=""/>
+        <p:cNvGrpSpPr/>
+        <p:nvPr/>
+      </p:nvGrpSpPr>
+      <p:grpSpPr>
+        <a:xfrm>
+          <a:off x="0" y="0"/>
+          <a:ext cx="0" cy="0"/>
+          <a:chOff x="0" y="0"/>
+          <a:chExt cx="0" cy="0"/>
+        </a:xfrm>
+      </p:grpSpPr>
+      <p:sp>
+        <p:nvSpPr>
+          <p:cNvPr id="2" name="Title 1"/>
+          <p:cNvSpPr>
+            <a:spLocks noGrp="1"/>
+          </p:cNvSpPr>
+          <p:nvPr>
+            <p:ph type="title"/>
+          </p:nvPr>
+        </p:nvSpPr>
+        <p:spPr/>
+        <p:txBody>
+          <a:bodyPr/>
+          <a:lstStyle/>
+          <a:p>
+            <a:r>
+              <a:rPr lang="en-CA" dirty="0" smtClean="0"/>
+              <a:t>Log likelihood pg130</a:t>
+            </a:r>
+            <a:endParaRPr lang="en-CA" dirty="0"/>
+          </a:p>
+        </p:txBody>
+      </p:sp>
+      <p:sp>
+        <p:nvSpPr>
+          <p:cNvPr id="3" name="Content Placeholder 2"/>
+          <p:cNvSpPr>
+            <a:spLocks noGrp="1"/>
+          </p:cNvSpPr>
+          <p:nvPr>
+            <p:ph idx="1"/>
+          </p:nvPr>
+        </p:nvSpPr>
+        <p:spPr/>
+        <p:txBody>
+          <a:bodyPr>
+            <a:normAutofit fontScale="92500" lnSpcReduction="10000"/>
+          </a:bodyPr>
+          <a:lstStyle/>
+          <a:p>
+            <a:r>
+              <a:rPr lang="en-CA" dirty="0" smtClean="0"/>
+              <a:t>Linear regression measures goodness of fit using squared error, logistic regression uses log-likelihood</a:t>
+            </a:r>
+          </a:p>
+          <a:p>
+            <a:r>
+              <a:rPr lang="en-CA" dirty="0" smtClean="0"/>
+              <a:t>Formulate for log-likelihood</a:t>
+            </a:r>
+          </a:p>
+          <a:p>
+            <a:r>
+              <a:rPr lang="en-CA" dirty="0" smtClean="0"/>
+              <a:t>Weights </a:t>
+            </a:r>
+            <a:r>
+              <a:rPr lang="en-CA" dirty="0" err="1" smtClean="0"/>
+              <a:t>wi</a:t>
+            </a:r>
+            <a:r>
+              <a:rPr lang="en-CA" dirty="0" smtClean="0"/>
+              <a:t> are chosen to maximize the log-likelihood</a:t>
+            </a:r>
+          </a:p>
+          <a:p>
+            <a:r>
+              <a:rPr lang="en-CA" dirty="0" smtClean="0"/>
+              <a:t>How to solve this maximization problem? Iteratively solve a sequence of weighted least-squares regression problems until the log-likelihood converges to a maximum</a:t>
+            </a:r>
+          </a:p>
+          <a:p>
+            <a:r>
+              <a:rPr lang="en-CA" dirty="0" smtClean="0"/>
+              <a:t>Decision boundary for 2-class logistic regression lies where the prediction probability is 0.5, which occurs when exponent is zero</a:t>
+            </a:r>
+          </a:p>
+          <a:p>
+            <a:r>
+              <a:rPr lang="en-CA" dirty="0" smtClean="0"/>
+              <a:t>(example of hyperplane from linear algebra)</a:t>
+            </a:r>
+          </a:p>
+          <a:p>
+            <a:r>
+              <a:rPr lang="en-CA" dirty="0" smtClean="0"/>
+              <a:t>(example of maximum likelihood)</a:t>
+            </a:r>
+            <a:endParaRPr lang="en-CA" dirty="0"/>
+          </a:p>
+        </p:txBody>
+      </p:sp>
+    </p:spTree>
+    <p:extLst>
+      <p:ext uri="{BB962C8B-B14F-4D97-AF65-F5344CB8AC3E}">
+        <p14:creationId xmlns:p14="http://schemas.microsoft.com/office/powerpoint/2010/main" val="951574964"/>
+      </p:ext>
+    </p:extLst>
+  </p:cSld>
+  <p:clrMapOvr>
+    <a:masterClrMapping/>
+  </p:clrMapOvr>
+  <p:timing>
+    <p:tnLst>
+      <p:par>
+        <p:cTn id="1" dur="indefinite" restart="never" nodeType="tmRoot"/>
+      </p:par>
+    </p:tnLst>
+  </p:timing>
+</p:sld>
+</file>
+
+<file path=ppt/slides/slide31.xml><?xml version="1.0" encoding="utf-8"?>
+<p:sld xmlns:a="http://schemas.openxmlformats.org/drawingml/2006/main" xmlns:r="http://schemas.openxmlformats.org/officeDocument/2006/relationships" xmlns:p="http://schemas.openxmlformats.org/presentationml/2006/main">
+  <p:cSld>
+    <p:spTree>
+      <p:nvGrpSpPr>
+        <p:cNvPr id="1" name=""/>
+        <p:cNvGrpSpPr/>
+        <p:nvPr/>
+      </p:nvGrpSpPr>
+      <p:grpSpPr>
+        <a:xfrm>
+          <a:off x="0" y="0"/>
+          <a:ext cx="0" cy="0"/>
+          <a:chOff x="0" y="0"/>
+          <a:chExt cx="0" cy="0"/>
+        </a:xfrm>
+      </p:grpSpPr>
+      <p:sp>
+        <p:nvSpPr>
+          <p:cNvPr id="2" name="Title 1"/>
+          <p:cNvSpPr>
+            <a:spLocks noGrp="1"/>
+          </p:cNvSpPr>
+          <p:nvPr>
+            <p:ph type="title"/>
+          </p:nvPr>
+        </p:nvSpPr>
+        <p:spPr/>
+        <p:txBody>
+          <a:bodyPr/>
+          <a:lstStyle/>
+          <a:p>
+            <a:r>
+              <a:rPr lang="en-CA" dirty="0" smtClean="0"/>
+              <a:t>Linear classification using the perceptron pg131</a:t>
+            </a:r>
+            <a:endParaRPr lang="en-CA" dirty="0"/>
+          </a:p>
+        </p:txBody>
+      </p:sp>
+      <p:sp>
+        <p:nvSpPr>
+          <p:cNvPr id="3" name="Content Placeholder 2"/>
+          <p:cNvSpPr>
+            <a:spLocks noGrp="1"/>
+          </p:cNvSpPr>
+          <p:nvPr>
+            <p:ph idx="1"/>
+          </p:nvPr>
+        </p:nvSpPr>
+        <p:spPr/>
+        <p:txBody>
+          <a:bodyPr>
+            <a:normAutofit lnSpcReduction="10000"/>
+          </a:bodyPr>
+          <a:lstStyle/>
+          <a:p>
+            <a:r>
+              <a:rPr lang="en-CA" dirty="0" smtClean="0"/>
+              <a:t>It is not necessary to perform probability estimations if the sole purpose of the model is to predict class labels</a:t>
+            </a:r>
+          </a:p>
+          <a:p>
+            <a:r>
+              <a:rPr lang="en-CA" dirty="0" smtClean="0"/>
+              <a:t>If data can be separated into two groups using a hyperplane, it is said to be linearly separable</a:t>
+            </a:r>
+          </a:p>
+          <a:p>
+            <a:r>
+              <a:rPr lang="en-CA" dirty="0" smtClean="0"/>
+              <a:t>IF the data is linearly separable, there is a simple algorithm for finding the separating hyperplane</a:t>
+            </a:r>
+          </a:p>
+          <a:p>
+            <a:r>
+              <a:rPr lang="en-CA" dirty="0" smtClean="0"/>
+              <a:t>First we examine the hyperplane equation:</a:t>
+            </a:r>
+          </a:p>
+          <a:p>
+            <a:r>
+              <a:rPr lang="en-CA" dirty="0" smtClean="0"/>
+              <a:t>w0a0 + w1a1 + … + </a:t>
+            </a:r>
+            <a:r>
+              <a:rPr lang="en-CA" dirty="0" err="1" smtClean="0"/>
+              <a:t>wkak</a:t>
+            </a:r>
+            <a:r>
+              <a:rPr lang="en-CA" dirty="0" smtClean="0"/>
+              <a:t> = 0 </a:t>
+            </a:r>
+          </a:p>
+          <a:p>
+            <a:r>
+              <a:rPr lang="en-CA" dirty="0" smtClean="0"/>
+              <a:t>a0 always = 1 (data augmentation), we want to find values for w so that the training examples are properly classified by the hyperplane</a:t>
+            </a:r>
+          </a:p>
+          <a:p>
+            <a:endParaRPr lang="en-CA" dirty="0" smtClean="0"/>
+          </a:p>
+          <a:p>
+            <a:endParaRPr lang="en-CA" dirty="0"/>
+          </a:p>
+        </p:txBody>
+      </p:sp>
+    </p:spTree>
+    <p:extLst>
+      <p:ext uri="{BB962C8B-B14F-4D97-AF65-F5344CB8AC3E}">
+        <p14:creationId xmlns:p14="http://schemas.microsoft.com/office/powerpoint/2010/main" val="138947027"/>
+      </p:ext>
+    </p:extLst>
+  </p:cSld>
+  <p:clrMapOvr>
+    <a:masterClrMapping/>
+  </p:clrMapOvr>
+  <p:timing>
+    <p:tnLst>
+      <p:par>
+        <p:cTn id="1" dur="indefinite" restart="never" nodeType="tmRoot"/>
+      </p:par>
+    </p:tnLst>
+  </p:timing>
+</p:sld>
+</file>
+
+<file path=ppt/slides/slide32.xml><?xml version="1.0" encoding="utf-8"?>
+<p:sld xmlns:a="http://schemas.openxmlformats.org/drawingml/2006/main" xmlns:r="http://schemas.openxmlformats.org/officeDocument/2006/relationships" xmlns:p="http://schemas.openxmlformats.org/presentationml/2006/main">
+  <p:cSld>
+    <p:spTree>
+      <p:nvGrpSpPr>
+        <p:cNvPr id="1" name=""/>
+        <p:cNvGrpSpPr/>
+        <p:nvPr/>
+      </p:nvGrpSpPr>
+      <p:grpSpPr>
+        <a:xfrm>
+          <a:off x="0" y="0"/>
+          <a:ext cx="0" cy="0"/>
+          <a:chOff x="0" y="0"/>
+          <a:chExt cx="0" cy="0"/>
+        </a:xfrm>
+      </p:grpSpPr>
+      <p:sp>
+        <p:nvSpPr>
+          <p:cNvPr id="2" name="Title 1"/>
+          <p:cNvSpPr>
+            <a:spLocks noGrp="1"/>
+          </p:cNvSpPr>
+          <p:nvPr>
+            <p:ph type="title"/>
+          </p:nvPr>
+        </p:nvSpPr>
+        <p:spPr/>
+        <p:txBody>
+          <a:bodyPr/>
+          <a:lstStyle/>
+          <a:p>
+            <a:r>
+              <a:rPr lang="en-CA" dirty="0" smtClean="0"/>
+              <a:t>Perceptron learning rule pg132</a:t>
+            </a:r>
+            <a:endParaRPr lang="en-CA" dirty="0"/>
+          </a:p>
+        </p:txBody>
+      </p:sp>
+      <p:sp>
+        <p:nvSpPr>
+          <p:cNvPr id="3" name="Content Placeholder 2"/>
+          <p:cNvSpPr>
+            <a:spLocks noGrp="1"/>
+          </p:cNvSpPr>
+          <p:nvPr>
+            <p:ph idx="1"/>
+          </p:nvPr>
+        </p:nvSpPr>
+        <p:spPr/>
+        <p:txBody>
+          <a:bodyPr>
+            <a:normAutofit fontScale="85000" lnSpcReduction="20000"/>
+          </a:bodyPr>
+          <a:lstStyle/>
+          <a:p>
+            <a:r>
+              <a:rPr lang="en-CA" dirty="0" smtClean="0"/>
+              <a:t>Set all weights to zero</a:t>
+            </a:r>
+          </a:p>
+          <a:p>
+            <a:r>
+              <a:rPr lang="en-CA" dirty="0" smtClean="0"/>
+              <a:t>Until all instances in training data are correctly classified:</a:t>
+            </a:r>
+          </a:p>
+          <a:p>
+            <a:pPr lvl="1"/>
+            <a:r>
+              <a:rPr lang="en-CA" sz="2800" dirty="0" smtClean="0"/>
+              <a:t>For each instance I in the training data</a:t>
+            </a:r>
+          </a:p>
+          <a:p>
+            <a:pPr lvl="2"/>
+            <a:r>
+              <a:rPr lang="en-CA" sz="2800" dirty="0" smtClean="0"/>
+              <a:t>If I is classified incorrectly by the perceptron</a:t>
+            </a:r>
+          </a:p>
+          <a:p>
+            <a:pPr lvl="3"/>
+            <a:r>
+              <a:rPr lang="en-CA" sz="2800" dirty="0" smtClean="0"/>
+              <a:t>If I belongs to the first class add it to the weight vector</a:t>
+            </a:r>
+          </a:p>
+          <a:p>
+            <a:pPr lvl="3"/>
+            <a:r>
+              <a:rPr lang="en-CA" sz="2800" dirty="0" smtClean="0"/>
+              <a:t>Else subtract I from the weight vector</a:t>
+            </a:r>
+          </a:p>
+          <a:p>
+            <a:r>
+              <a:rPr lang="en-CA" dirty="0" smtClean="0"/>
+              <a:t>Each iteration goes through all the training instances</a:t>
+            </a:r>
+          </a:p>
+          <a:p>
+            <a:r>
+              <a:rPr lang="en-CA" dirty="0" smtClean="0"/>
+              <a:t>If a misclassified instances is encountered, the parameters of the hyperplane are changed so that the misclassified instance moves closer to or across the hyperplane</a:t>
+            </a:r>
+          </a:p>
+          <a:p>
+            <a:r>
+              <a:rPr lang="en-CA" dirty="0" smtClean="0"/>
+              <a:t>If the instance belongs to the first class this is done by adding its attributes to the weight vector, otherwise we subtract the attributes from weight vector</a:t>
+            </a:r>
+          </a:p>
+          <a:p>
+            <a:r>
+              <a:rPr lang="en-CA" dirty="0" smtClean="0"/>
+              <a:t>Why does this work? </a:t>
+            </a:r>
+            <a:r>
+              <a:rPr lang="en-CA" dirty="0" err="1" smtClean="0"/>
+              <a:t>Pg</a:t>
+            </a:r>
+            <a:r>
+              <a:rPr lang="en-CA" dirty="0" smtClean="0"/>
+              <a:t> 133</a:t>
+            </a:r>
+            <a:endParaRPr lang="en-CA" dirty="0"/>
+          </a:p>
+        </p:txBody>
+      </p:sp>
+    </p:spTree>
+    <p:extLst>
+      <p:ext uri="{BB962C8B-B14F-4D97-AF65-F5344CB8AC3E}">
+        <p14:creationId xmlns:p14="http://schemas.microsoft.com/office/powerpoint/2010/main" val="1896818093"/>
+      </p:ext>
+    </p:extLst>
+  </p:cSld>
+  <p:clrMapOvr>
+    <a:masterClrMapping/>
+  </p:clrMapOvr>
+  <p:timing>
+    <p:tnLst>
+      <p:par>
+        <p:cTn id="1" dur="indefinite" restart="never" nodeType="tmRoot"/>
+      </p:par>
+    </p:tnLst>
+  </p:timing>
+</p:sld>
+</file>
+
+<file path=ppt/slides/slide33.xml><?xml version="1.0" encoding="utf-8"?>
+<p:sld xmlns:a="http://schemas.openxmlformats.org/drawingml/2006/main" xmlns:r="http://schemas.openxmlformats.org/officeDocument/2006/relationships" xmlns:p="http://schemas.openxmlformats.org/presentationml/2006/main">
+  <p:cSld>
+    <p:spTree>
+      <p:nvGrpSpPr>
+        <p:cNvPr id="1" name=""/>
+        <p:cNvGrpSpPr/>
+        <p:nvPr/>
+      </p:nvGrpSpPr>
+      <p:grpSpPr>
+        <a:xfrm>
+          <a:off x="0" y="0"/>
+          <a:ext cx="0" cy="0"/>
+          <a:chOff x="0" y="0"/>
+          <a:chExt cx="0" cy="0"/>
+        </a:xfrm>
+      </p:grpSpPr>
+      <p:sp>
+        <p:nvSpPr>
+          <p:cNvPr id="2" name="Title 1"/>
+          <p:cNvSpPr>
+            <a:spLocks noGrp="1"/>
+          </p:cNvSpPr>
+          <p:nvPr>
+            <p:ph type="title"/>
+          </p:nvPr>
+        </p:nvSpPr>
+        <p:spPr/>
+        <p:txBody>
+          <a:bodyPr/>
+          <a:lstStyle/>
+          <a:p>
+            <a:r>
+              <a:rPr lang="en-CA" dirty="0" smtClean="0"/>
+              <a:t>Linear classification using Winnow pg134</a:t>
+            </a:r>
+            <a:endParaRPr lang="en-CA" dirty="0"/>
+          </a:p>
+        </p:txBody>
+      </p:sp>
+      <p:sp>
+        <p:nvSpPr>
+          <p:cNvPr id="3" name="Content Placeholder 2"/>
+          <p:cNvSpPr>
+            <a:spLocks noGrp="1"/>
+          </p:cNvSpPr>
+          <p:nvPr>
+            <p:ph idx="1"/>
+          </p:nvPr>
+        </p:nvSpPr>
+        <p:spPr/>
+        <p:txBody>
+          <a:bodyPr>
+            <a:normAutofit fontScale="77500" lnSpcReduction="20000"/>
+          </a:bodyPr>
+          <a:lstStyle/>
+          <a:p>
+            <a:r>
+              <a:rPr lang="en-CA" dirty="0" smtClean="0"/>
+              <a:t>Perceptron is not only algorithm guaranteed to find separating hyperplane for linearly separable problem</a:t>
+            </a:r>
+          </a:p>
+          <a:p>
+            <a:r>
+              <a:rPr lang="en-CA" dirty="0" smtClean="0"/>
+              <a:t>Winnow is an alternative, for datasets with binary attributes</a:t>
+            </a:r>
+          </a:p>
+          <a:p>
+            <a:r>
+              <a:rPr lang="en-CA" dirty="0" smtClean="0"/>
+              <a:t>Mistake driven</a:t>
+            </a:r>
+          </a:p>
+          <a:p>
+            <a:r>
+              <a:rPr lang="en-CA" dirty="0" smtClean="0"/>
+              <a:t>Winnow employs multiplicative updates and alters weights individually by multiplying them by a user-specified parameter alpha</a:t>
+            </a:r>
+          </a:p>
+          <a:p>
+            <a:r>
+              <a:rPr lang="en-CA" dirty="0" smtClean="0"/>
+              <a:t>Balanced vs unbalanced Winnow – balanced winnow allows for negative weights, using a weight vector for each class</a:t>
+            </a:r>
+          </a:p>
+          <a:p>
+            <a:r>
+              <a:rPr lang="en-CA" dirty="0" smtClean="0"/>
+              <a:t>An instance is belonging to class 1 if: </a:t>
+            </a:r>
+          </a:p>
+          <a:p>
+            <a:pPr lvl="1"/>
+            <a:r>
+              <a:rPr lang="en-CA" dirty="0" smtClean="0"/>
+              <a:t>(w0+ - w0-)a0 + (w1+ - w1-)a1 + … + (</a:t>
+            </a:r>
+            <a:r>
+              <a:rPr lang="en-CA" dirty="0" err="1" smtClean="0"/>
+              <a:t>wk</a:t>
+            </a:r>
+            <a:r>
+              <a:rPr lang="en-CA" dirty="0" smtClean="0"/>
+              <a:t>+ - </a:t>
+            </a:r>
+            <a:r>
+              <a:rPr lang="en-CA" dirty="0" err="1" smtClean="0"/>
+              <a:t>wk</a:t>
+            </a:r>
+            <a:r>
+              <a:rPr lang="en-CA" dirty="0" smtClean="0"/>
+              <a:t>-)</a:t>
+            </a:r>
+            <a:r>
+              <a:rPr lang="en-CA" dirty="0" err="1" smtClean="0"/>
+              <a:t>ak</a:t>
+            </a:r>
+            <a:r>
+              <a:rPr lang="en-CA" dirty="0" smtClean="0"/>
+              <a:t> &gt; theta</a:t>
+            </a:r>
+          </a:p>
+          <a:p>
+            <a:pPr lvl="1"/>
+            <a:r>
+              <a:rPr lang="en-CA" dirty="0" smtClean="0"/>
+              <a:t>Where theta is a user-specified threshold parameter</a:t>
+            </a:r>
+          </a:p>
+          <a:p>
+            <a:r>
+              <a:rPr lang="en-CA" dirty="0" smtClean="0"/>
+              <a:t>Winnow is an attribute-efficient learner which means in hones in on </a:t>
+            </a:r>
+            <a:r>
+              <a:rPr lang="en-CA" dirty="0" err="1" smtClean="0"/>
+              <a:t>relevent</a:t>
+            </a:r>
+            <a:r>
+              <a:rPr lang="en-CA" dirty="0" smtClean="0"/>
+              <a:t> features in a dataset – good if algorithm has many binary features most of which are irrelevant</a:t>
+            </a:r>
+            <a:endParaRPr lang="en-CA" dirty="0"/>
+          </a:p>
+        </p:txBody>
+      </p:sp>
+    </p:spTree>
+    <p:extLst>
+      <p:ext uri="{BB962C8B-B14F-4D97-AF65-F5344CB8AC3E}">
+        <p14:creationId xmlns:p14="http://schemas.microsoft.com/office/powerpoint/2010/main" val="497761285"/>
+      </p:ext>
+    </p:extLst>
+  </p:cSld>
+  <p:clrMapOvr>
+    <a:masterClrMapping/>
+  </p:clrMapOvr>
+  <p:timing>
+    <p:tnLst>
+      <p:par>
+        <p:cTn id="1" dur="indefinite" restart="never" nodeType="tmRoot"/>
+      </p:par>
+    </p:tnLst>
+  </p:timing>
+</p:sld>
+</file>
+
+<file path=ppt/slides/slide34.xml><?xml version="1.0" encoding="utf-8"?>
+<p:sld xmlns:a="http://schemas.openxmlformats.org/drawingml/2006/main" xmlns:r="http://schemas.openxmlformats.org/officeDocument/2006/relationships" xmlns:p="http://schemas.openxmlformats.org/presentationml/2006/main">
+  <p:cSld>
+    <p:spTree>
+      <p:nvGrpSpPr>
+        <p:cNvPr id="1" name=""/>
+        <p:cNvGrpSpPr/>
+        <p:nvPr/>
+      </p:nvGrpSpPr>
+      <p:grpSpPr>
+        <a:xfrm>
+          <a:off x="0" y="0"/>
+          <a:ext cx="0" cy="0"/>
+          <a:chOff x="0" y="0"/>
+          <a:chExt cx="0" cy="0"/>
+        </a:xfrm>
+      </p:grpSpPr>
+      <p:sp>
+        <p:nvSpPr>
+          <p:cNvPr id="2" name="Title 1"/>
+          <p:cNvSpPr>
+            <a:spLocks noGrp="1"/>
+          </p:cNvSpPr>
+          <p:nvPr>
+            <p:ph type="title"/>
+          </p:nvPr>
+        </p:nvSpPr>
+        <p:spPr/>
+        <p:txBody>
+          <a:bodyPr/>
+          <a:lstStyle/>
+          <a:p>
+            <a:r>
+              <a:rPr lang="en-CA" dirty="0" smtClean="0"/>
+              <a:t>Unbalanced winnow algorithm pg134</a:t>
+            </a:r>
+            <a:endParaRPr lang="en-CA" dirty="0"/>
+          </a:p>
+        </p:txBody>
+      </p:sp>
+      <p:sp>
+        <p:nvSpPr>
+          <p:cNvPr id="3" name="Content Placeholder 2"/>
+          <p:cNvSpPr>
+            <a:spLocks noGrp="1"/>
+          </p:cNvSpPr>
+          <p:nvPr>
+            <p:ph idx="1"/>
+          </p:nvPr>
+        </p:nvSpPr>
+        <p:spPr/>
+        <p:txBody>
+          <a:bodyPr/>
+          <a:lstStyle/>
+          <a:p>
+            <a:r>
+              <a:rPr lang="en-CA" dirty="0" smtClean="0"/>
+              <a:t>While some instances are misclassified</a:t>
+            </a:r>
+          </a:p>
+          <a:p>
+            <a:pPr lvl="1"/>
+            <a:r>
+              <a:rPr lang="en-CA" dirty="0" smtClean="0"/>
+              <a:t>For every instance a</a:t>
+            </a:r>
+          </a:p>
+          <a:p>
+            <a:pPr lvl="2"/>
+            <a:r>
+              <a:rPr lang="en-CA" sz="2400" dirty="0" smtClean="0"/>
+              <a:t>Classify a using the current weights</a:t>
+            </a:r>
+          </a:p>
+          <a:p>
+            <a:pPr lvl="2"/>
+            <a:r>
+              <a:rPr lang="en-CA" sz="2400" dirty="0" smtClean="0"/>
+              <a:t>If the predicted class is incorrect</a:t>
+            </a:r>
+          </a:p>
+          <a:p>
+            <a:pPr lvl="3"/>
+            <a:r>
+              <a:rPr lang="en-CA" sz="2400" dirty="0" smtClean="0"/>
+              <a:t>If a belongs to the first class</a:t>
+            </a:r>
+          </a:p>
+          <a:p>
+            <a:pPr lvl="4"/>
+            <a:r>
+              <a:rPr lang="en-CA" sz="2400" dirty="0" smtClean="0"/>
+              <a:t>For each </a:t>
+            </a:r>
+            <a:r>
+              <a:rPr lang="en-CA" sz="2400" dirty="0" err="1" smtClean="0"/>
+              <a:t>ai</a:t>
+            </a:r>
+            <a:r>
+              <a:rPr lang="en-CA" sz="2400" dirty="0"/>
+              <a:t>=</a:t>
+            </a:r>
+            <a:r>
+              <a:rPr lang="en-CA" sz="2400" dirty="0" smtClean="0"/>
+              <a:t>1, multiply </a:t>
+            </a:r>
+            <a:r>
+              <a:rPr lang="en-CA" sz="2400" dirty="0" err="1" smtClean="0"/>
+              <a:t>wi</a:t>
+            </a:r>
+            <a:r>
+              <a:rPr lang="en-CA" sz="2400" dirty="0" smtClean="0"/>
+              <a:t> by alpha</a:t>
+            </a:r>
+          </a:p>
+          <a:p>
+            <a:pPr lvl="4"/>
+            <a:r>
+              <a:rPr lang="en-CA" sz="2400" dirty="0" smtClean="0"/>
+              <a:t>(if </a:t>
+            </a:r>
+            <a:r>
+              <a:rPr lang="en-CA" sz="2400" dirty="0" err="1" smtClean="0"/>
+              <a:t>ai</a:t>
+            </a:r>
+            <a:r>
+              <a:rPr lang="en-CA" sz="2400" dirty="0" smtClean="0"/>
+              <a:t>=0, leave </a:t>
+            </a:r>
+            <a:r>
+              <a:rPr lang="en-CA" sz="2400" dirty="0" err="1" smtClean="0"/>
+              <a:t>wi</a:t>
+            </a:r>
+            <a:r>
+              <a:rPr lang="en-CA" sz="2400" dirty="0" smtClean="0"/>
+              <a:t> unchanged)</a:t>
+            </a:r>
+          </a:p>
+          <a:p>
+            <a:pPr lvl="3"/>
+            <a:r>
+              <a:rPr lang="en-CA" sz="2400" dirty="0" smtClean="0"/>
+              <a:t>Otherwise</a:t>
+            </a:r>
+          </a:p>
+          <a:p>
+            <a:pPr lvl="4"/>
+            <a:r>
+              <a:rPr lang="en-CA" sz="2400" dirty="0" smtClean="0"/>
+              <a:t>For each </a:t>
+            </a:r>
+            <a:r>
+              <a:rPr lang="en-CA" sz="2400" dirty="0" err="1" smtClean="0"/>
+              <a:t>ai</a:t>
+            </a:r>
+            <a:r>
+              <a:rPr lang="en-CA" sz="2400" dirty="0"/>
+              <a:t>=</a:t>
+            </a:r>
+            <a:r>
+              <a:rPr lang="en-CA" sz="2400" dirty="0" smtClean="0"/>
+              <a:t>1, divide </a:t>
+            </a:r>
+            <a:r>
+              <a:rPr lang="en-CA" sz="2400" dirty="0" err="1" smtClean="0"/>
+              <a:t>wi</a:t>
+            </a:r>
+            <a:r>
+              <a:rPr lang="en-CA" sz="2400" dirty="0" smtClean="0"/>
+              <a:t> by alpha</a:t>
+            </a:r>
+          </a:p>
+          <a:p>
+            <a:pPr lvl="4"/>
+            <a:r>
+              <a:rPr lang="en-CA" sz="2400" dirty="0" smtClean="0"/>
+              <a:t>(if </a:t>
+            </a:r>
+            <a:r>
+              <a:rPr lang="en-CA" sz="2400" dirty="0" err="1" smtClean="0"/>
+              <a:t>ai</a:t>
+            </a:r>
+            <a:r>
+              <a:rPr lang="en-CA" sz="2400" dirty="0" smtClean="0"/>
+              <a:t>=0, leave </a:t>
+            </a:r>
+            <a:r>
+              <a:rPr lang="en-CA" sz="2400" dirty="0" err="1" smtClean="0"/>
+              <a:t>wi</a:t>
+            </a:r>
+            <a:r>
+              <a:rPr lang="en-CA" sz="2400" dirty="0" smtClean="0"/>
+              <a:t> unchanged)</a:t>
+            </a:r>
+            <a:endParaRPr lang="en-CA" sz="2400" dirty="0"/>
+          </a:p>
+        </p:txBody>
+      </p:sp>
+    </p:spTree>
+    <p:extLst>
+      <p:ext uri="{BB962C8B-B14F-4D97-AF65-F5344CB8AC3E}">
+        <p14:creationId xmlns:p14="http://schemas.microsoft.com/office/powerpoint/2010/main" val="836567340"/>
+      </p:ext>
+    </p:extLst>
+  </p:cSld>
+  <p:clrMapOvr>
+    <a:masterClrMapping/>
+  </p:clrMapOvr>
+  <p:timing>
+    <p:tnLst>
+      <p:par>
+        <p:cTn id="1" dur="indefinite" restart="never" nodeType="tmRoot"/>
+      </p:par>
+    </p:tnLst>
+  </p:timing>
+</p:sld>
+</file>
+
+<file path=ppt/slides/slide35.xml><?xml version="1.0" encoding="utf-8"?>
+<p:sld xmlns:a="http://schemas.openxmlformats.org/drawingml/2006/main" xmlns:r="http://schemas.openxmlformats.org/officeDocument/2006/relationships" xmlns:p="http://schemas.openxmlformats.org/presentationml/2006/main">
+  <p:cSld>
+    <p:spTree>
+      <p:nvGrpSpPr>
+        <p:cNvPr id="1" name=""/>
+        <p:cNvGrpSpPr/>
+        <p:nvPr/>
+      </p:nvGrpSpPr>
+      <p:grpSpPr>
+        <a:xfrm>
+          <a:off x="0" y="0"/>
+          <a:ext cx="0" cy="0"/>
+          <a:chOff x="0" y="0"/>
+          <a:chExt cx="0" cy="0"/>
+        </a:xfrm>
+      </p:grpSpPr>
+      <p:sp>
+        <p:nvSpPr>
+          <p:cNvPr id="2" name="Title 1"/>
+          <p:cNvSpPr>
+            <a:spLocks noGrp="1"/>
+          </p:cNvSpPr>
+          <p:nvPr>
+            <p:ph type="title"/>
+          </p:nvPr>
+        </p:nvSpPr>
+        <p:spPr/>
+        <p:txBody>
+          <a:bodyPr/>
+          <a:lstStyle/>
+          <a:p>
+            <a:r>
+              <a:rPr lang="en-CA" dirty="0" smtClean="0"/>
+              <a:t>Balanced Winnow algorithm pg134</a:t>
+            </a:r>
+            <a:endParaRPr lang="en-CA" dirty="0"/>
+          </a:p>
+        </p:txBody>
+      </p:sp>
+      <p:sp>
+        <p:nvSpPr>
+          <p:cNvPr id="3" name="Content Placeholder 2"/>
+          <p:cNvSpPr>
+            <a:spLocks noGrp="1"/>
+          </p:cNvSpPr>
+          <p:nvPr>
+            <p:ph idx="1"/>
+          </p:nvPr>
+        </p:nvSpPr>
+        <p:spPr>
+          <a:xfrm>
+            <a:off x="838200" y="1825625"/>
+            <a:ext cx="10515600" cy="4658302"/>
+          </a:xfrm>
+        </p:spPr>
+        <p:txBody>
+          <a:bodyPr>
+            <a:normAutofit/>
+          </a:bodyPr>
+          <a:lstStyle/>
+          <a:p>
+            <a:r>
+              <a:rPr lang="en-CA" dirty="0" smtClean="0"/>
+              <a:t>While some instances are misclassified</a:t>
+            </a:r>
+          </a:p>
+          <a:p>
+            <a:pPr lvl="1"/>
+            <a:r>
+              <a:rPr lang="en-CA" dirty="0" smtClean="0"/>
+              <a:t>For every instance a</a:t>
+            </a:r>
+          </a:p>
+          <a:p>
+            <a:pPr lvl="2"/>
+            <a:r>
+              <a:rPr lang="en-CA" dirty="0" smtClean="0"/>
+              <a:t>Classify a using the current weights</a:t>
+            </a:r>
+          </a:p>
+          <a:p>
+            <a:pPr lvl="2"/>
+            <a:r>
+              <a:rPr lang="en-CA" dirty="0" smtClean="0"/>
+              <a:t>If the predicted class is incorrect</a:t>
+            </a:r>
+          </a:p>
+          <a:p>
+            <a:pPr lvl="3"/>
+            <a:r>
+              <a:rPr lang="en-CA" dirty="0" smtClean="0"/>
+              <a:t>If a belongs to the first class</a:t>
+            </a:r>
+          </a:p>
+          <a:p>
+            <a:pPr lvl="4"/>
+            <a:r>
+              <a:rPr lang="en-CA" dirty="0" smtClean="0"/>
+              <a:t>For each </a:t>
+            </a:r>
+            <a:r>
+              <a:rPr lang="en-CA" dirty="0" err="1" smtClean="0"/>
+              <a:t>ai</a:t>
+            </a:r>
+            <a:r>
+              <a:rPr lang="en-CA" dirty="0" smtClean="0"/>
+              <a:t>=1</a:t>
+            </a:r>
+          </a:p>
+          <a:p>
+            <a:pPr lvl="5"/>
+            <a:r>
+              <a:rPr lang="en-CA" dirty="0" smtClean="0"/>
+              <a:t>Multiply </a:t>
+            </a:r>
+            <a:r>
+              <a:rPr lang="en-CA" dirty="0" err="1" smtClean="0"/>
+              <a:t>wi</a:t>
+            </a:r>
+            <a:r>
+              <a:rPr lang="en-CA" dirty="0" smtClean="0"/>
+              <a:t>+ by alpha</a:t>
+            </a:r>
+          </a:p>
+          <a:p>
+            <a:pPr lvl="5"/>
+            <a:r>
+              <a:rPr lang="en-CA" dirty="0" smtClean="0"/>
+              <a:t>Divide </a:t>
+            </a:r>
+            <a:r>
+              <a:rPr lang="en-CA" dirty="0" err="1" smtClean="0"/>
+              <a:t>wi</a:t>
+            </a:r>
+            <a:r>
+              <a:rPr lang="en-CA" dirty="0" smtClean="0"/>
+              <a:t>- by alpha</a:t>
+            </a:r>
+          </a:p>
+          <a:p>
+            <a:pPr lvl="4"/>
+            <a:r>
+              <a:rPr lang="en-CA" dirty="0" smtClean="0"/>
+              <a:t>If </a:t>
+            </a:r>
+            <a:r>
+              <a:rPr lang="en-CA" dirty="0" err="1" smtClean="0"/>
+              <a:t>ai</a:t>
+            </a:r>
+            <a:r>
+              <a:rPr lang="en-CA" dirty="0" smtClean="0"/>
+              <a:t>=0, leave </a:t>
+            </a:r>
+            <a:r>
+              <a:rPr lang="en-CA" dirty="0" err="1" smtClean="0"/>
+              <a:t>wi</a:t>
+            </a:r>
+            <a:r>
+              <a:rPr lang="en-CA" dirty="0" smtClean="0"/>
+              <a:t>+ and </a:t>
+            </a:r>
+            <a:r>
+              <a:rPr lang="en-CA" dirty="0" err="1" smtClean="0"/>
+              <a:t>wi</a:t>
+            </a:r>
+            <a:r>
+              <a:rPr lang="en-CA" dirty="0" smtClean="0"/>
+              <a:t>- unchanged</a:t>
+            </a:r>
+          </a:p>
+          <a:p>
+            <a:pPr lvl="3"/>
+            <a:r>
+              <a:rPr lang="en-CA" dirty="0" smtClean="0"/>
+              <a:t>Otherwise</a:t>
+            </a:r>
+          </a:p>
+          <a:p>
+            <a:pPr lvl="4"/>
+            <a:r>
+              <a:rPr lang="en-CA" dirty="0" smtClean="0"/>
+              <a:t>For each </a:t>
+            </a:r>
+            <a:r>
+              <a:rPr lang="en-CA" dirty="0" err="1" smtClean="0"/>
+              <a:t>ai</a:t>
+            </a:r>
+            <a:r>
+              <a:rPr lang="en-CA" dirty="0" smtClean="0"/>
+              <a:t>=1</a:t>
+            </a:r>
+          </a:p>
+          <a:p>
+            <a:pPr lvl="5"/>
+            <a:r>
+              <a:rPr lang="en-CA" dirty="0" smtClean="0"/>
+              <a:t>Multiply </a:t>
+            </a:r>
+            <a:r>
+              <a:rPr lang="en-CA" dirty="0" err="1" smtClean="0"/>
+              <a:t>wi</a:t>
+            </a:r>
+            <a:r>
+              <a:rPr lang="en-CA" dirty="0" smtClean="0"/>
+              <a:t>- by alpha</a:t>
+            </a:r>
+          </a:p>
+          <a:p>
+            <a:pPr lvl="5"/>
+            <a:r>
+              <a:rPr lang="en-CA" dirty="0" smtClean="0"/>
+              <a:t>Divide </a:t>
+            </a:r>
+            <a:r>
+              <a:rPr lang="en-CA" dirty="0" err="1" smtClean="0"/>
+              <a:t>wi</a:t>
+            </a:r>
+            <a:r>
+              <a:rPr lang="en-CA" dirty="0" smtClean="0"/>
+              <a:t>+ by alpha</a:t>
+            </a:r>
+          </a:p>
+          <a:p>
+            <a:pPr lvl="4"/>
+            <a:r>
+              <a:rPr lang="en-CA" dirty="0" smtClean="0"/>
+              <a:t>If </a:t>
+            </a:r>
+            <a:r>
+              <a:rPr lang="en-CA" dirty="0" err="1" smtClean="0"/>
+              <a:t>ai</a:t>
+            </a:r>
+            <a:r>
+              <a:rPr lang="en-CA" dirty="0" smtClean="0"/>
+              <a:t>=0, leave </a:t>
+            </a:r>
+            <a:r>
+              <a:rPr lang="en-CA" dirty="0" err="1" smtClean="0"/>
+              <a:t>wi</a:t>
+            </a:r>
+            <a:r>
+              <a:rPr lang="en-CA" dirty="0" smtClean="0"/>
+              <a:t>- and </a:t>
+            </a:r>
+            <a:r>
+              <a:rPr lang="en-CA" dirty="0" err="1" smtClean="0"/>
+              <a:t>wi</a:t>
+            </a:r>
+            <a:r>
+              <a:rPr lang="en-CA" dirty="0" smtClean="0"/>
+              <a:t>+ unchanged</a:t>
+            </a:r>
+            <a:endParaRPr lang="en-CA" dirty="0"/>
+          </a:p>
+        </p:txBody>
+      </p:sp>
+    </p:spTree>
+    <p:extLst>
+      <p:ext uri="{BB962C8B-B14F-4D97-AF65-F5344CB8AC3E}">
+        <p14:creationId xmlns:p14="http://schemas.microsoft.com/office/powerpoint/2010/main" val="3983455974"/>
+      </p:ext>
+    </p:extLst>
+  </p:cSld>
+  <p:clrMapOvr>
+    <a:masterClrMapping/>
+  </p:clrMapOvr>
+  <p:timing>
+    <p:tnLst>
+      <p:par>
+        <p:cTn id="1" dur="indefinite" restart="never" nodeType="tmRoot"/>
+      </p:par>
+    </p:tnLst>
+  </p:timing>
+</p:sld>
+</file>
+
+<file path=ppt/slides/slide36.xml><?xml version="1.0" encoding="utf-8"?>
+<p:sld xmlns:a="http://schemas.openxmlformats.org/drawingml/2006/main" xmlns:r="http://schemas.openxmlformats.org/officeDocument/2006/relationships" xmlns:p="http://schemas.openxmlformats.org/presentationml/2006/main">
+  <p:cSld>
+    <p:spTree>
+      <p:nvGrpSpPr>
+        <p:cNvPr id="1" name=""/>
+        <p:cNvGrpSpPr/>
+        <p:nvPr/>
+      </p:nvGrpSpPr>
+      <p:grpSpPr>
+        <a:xfrm>
+          <a:off x="0" y="0"/>
+          <a:ext cx="0" cy="0"/>
+          <a:chOff x="0" y="0"/>
+          <a:chExt cx="0" cy="0"/>
+        </a:xfrm>
+      </p:grpSpPr>
+      <p:sp>
+        <p:nvSpPr>
+          <p:cNvPr id="2" name="Title 1"/>
+          <p:cNvSpPr>
+            <a:spLocks noGrp="1"/>
+          </p:cNvSpPr>
+          <p:nvPr>
+            <p:ph type="title"/>
+          </p:nvPr>
+        </p:nvSpPr>
+        <p:spPr/>
+        <p:txBody>
+          <a:bodyPr/>
+          <a:lstStyle/>
+          <a:p>
+            <a:r>
+              <a:rPr lang="en-CA" dirty="0" smtClean="0"/>
+              <a:t>4.7 Instance-based learning pg134</a:t>
+            </a:r>
+            <a:endParaRPr lang="en-CA" dirty="0"/>
+          </a:p>
+        </p:txBody>
+      </p:sp>
+      <p:sp>
+        <p:nvSpPr>
+          <p:cNvPr id="3" name="Content Placeholder 2"/>
+          <p:cNvSpPr>
+            <a:spLocks noGrp="1"/>
+          </p:cNvSpPr>
+          <p:nvPr>
+            <p:ph idx="1"/>
+          </p:nvPr>
+        </p:nvSpPr>
+        <p:spPr/>
+        <p:txBody>
+          <a:bodyPr>
+            <a:normAutofit fontScale="85000" lnSpcReduction="20000"/>
+          </a:bodyPr>
+          <a:lstStyle/>
+          <a:p>
+            <a:r>
+              <a:rPr lang="en-CA" dirty="0" smtClean="0"/>
+              <a:t>In instance based learning the instances (training examples) are stored and a distance function is used to determine which member of the training set is closest to an unknown test instance</a:t>
+            </a:r>
+          </a:p>
+          <a:p>
+            <a:r>
+              <a:rPr lang="en-CA" dirty="0" smtClean="0"/>
+              <a:t>The distance function</a:t>
+            </a:r>
+          </a:p>
+          <a:p>
+            <a:r>
+              <a:rPr lang="en-CA" dirty="0" smtClean="0"/>
+              <a:t>Euclidean distance (Square-root formula) or sum of squares</a:t>
+            </a:r>
+          </a:p>
+          <a:p>
+            <a:r>
+              <a:rPr lang="en-CA" dirty="0" smtClean="0"/>
+              <a:t>Other distance functions can be used (what does distance mean in attribute space?)</a:t>
+            </a:r>
+          </a:p>
+          <a:p>
+            <a:r>
+              <a:rPr lang="en-CA" dirty="0" smtClean="0"/>
+              <a:t>Usually we normalize all attributes to lie between 0 and 1</a:t>
+            </a:r>
+          </a:p>
+          <a:p>
+            <a:pPr lvl="1"/>
+            <a:r>
+              <a:rPr lang="en-CA" dirty="0" err="1" smtClean="0"/>
+              <a:t>ai</a:t>
+            </a:r>
+            <a:r>
+              <a:rPr lang="en-CA" dirty="0" smtClean="0"/>
+              <a:t> = (vi-min(vi)) / (max(vi) – min(vi)) </a:t>
+            </a:r>
+          </a:p>
+          <a:p>
+            <a:r>
+              <a:rPr lang="en-CA" dirty="0" smtClean="0"/>
+              <a:t>For nominal attributes, we use 0 and 1 for different or same</a:t>
+            </a:r>
+          </a:p>
+          <a:p>
+            <a:r>
+              <a:rPr lang="en-CA" dirty="0" smtClean="0"/>
+              <a:t>If a value is missing, take normalized size of other value or 1-normalize size (whichever is larger)</a:t>
+            </a:r>
+          </a:p>
+          <a:p>
+            <a:r>
+              <a:rPr lang="en-CA" dirty="0" smtClean="0"/>
+              <a:t>If both values missing the distance is 1 (maximal)</a:t>
+            </a:r>
+          </a:p>
+          <a:p>
+            <a:endParaRPr lang="en-CA" dirty="0"/>
+          </a:p>
+        </p:txBody>
+      </p:sp>
+    </p:spTree>
+    <p:extLst>
+      <p:ext uri="{BB962C8B-B14F-4D97-AF65-F5344CB8AC3E}">
+        <p14:creationId xmlns:p14="http://schemas.microsoft.com/office/powerpoint/2010/main" val="3623884701"/>
+      </p:ext>
+    </p:extLst>
+  </p:cSld>
+  <p:clrMapOvr>
+    <a:masterClrMapping/>
+  </p:clrMapOvr>
+  <p:timing>
+    <p:tnLst>
+      <p:par>
+        <p:cTn id="1" dur="indefinite" restart="never" nodeType="tmRoot"/>
+      </p:par>
+    </p:tnLst>
+  </p:timing>
+</p:sld>
+</file>
+
+<file path=ppt/slides/slide37.xml><?xml version="1.0" encoding="utf-8"?>
+<p:sld xmlns:a="http://schemas.openxmlformats.org/drawingml/2006/main" xmlns:r="http://schemas.openxmlformats.org/officeDocument/2006/relationships" xmlns:p="http://schemas.openxmlformats.org/presentationml/2006/main">
+  <p:cSld>
+    <p:spTree>
+      <p:nvGrpSpPr>
+        <p:cNvPr id="1" name=""/>
+        <p:cNvGrpSpPr/>
+        <p:nvPr/>
+      </p:nvGrpSpPr>
+      <p:grpSpPr>
+        <a:xfrm>
+          <a:off x="0" y="0"/>
+          <a:ext cx="0" cy="0"/>
+          <a:chOff x="0" y="0"/>
+          <a:chExt cx="0" cy="0"/>
+        </a:xfrm>
+      </p:grpSpPr>
+      <p:sp>
+        <p:nvSpPr>
+          <p:cNvPr id="2" name="Title 1"/>
+          <p:cNvSpPr>
+            <a:spLocks noGrp="1"/>
+          </p:cNvSpPr>
+          <p:nvPr>
+            <p:ph type="title"/>
+          </p:nvPr>
+        </p:nvSpPr>
+        <p:spPr/>
+        <p:txBody>
+          <a:bodyPr/>
+          <a:lstStyle/>
+          <a:p>
+            <a:r>
+              <a:rPr lang="en-CA" dirty="0" smtClean="0"/>
+              <a:t>Finding nearest neighbours efficiently pg136</a:t>
+            </a:r>
+            <a:endParaRPr lang="en-CA" dirty="0"/>
+          </a:p>
+        </p:txBody>
+      </p:sp>
+      <p:sp>
+        <p:nvSpPr>
+          <p:cNvPr id="3" name="Content Placeholder 2"/>
+          <p:cNvSpPr>
+            <a:spLocks noGrp="1"/>
+          </p:cNvSpPr>
+          <p:nvPr>
+            <p:ph idx="1"/>
+          </p:nvPr>
+        </p:nvSpPr>
+        <p:spPr/>
+        <p:txBody>
+          <a:bodyPr/>
+          <a:lstStyle/>
+          <a:p>
+            <a:r>
+              <a:rPr lang="en-CA" dirty="0" smtClean="0"/>
+              <a:t>Obvious way is to calculate distance from new instance to all other instances and take the smallest</a:t>
+            </a:r>
+          </a:p>
+          <a:p>
+            <a:r>
+              <a:rPr lang="en-CA" dirty="0" err="1" smtClean="0"/>
+              <a:t>kD</a:t>
+            </a:r>
+            <a:r>
+              <a:rPr lang="en-CA" dirty="0" smtClean="0"/>
+              <a:t>-tree allows to find nearest neighbours more efficiently</a:t>
+            </a:r>
+          </a:p>
+          <a:p>
+            <a:pPr lvl="1"/>
+            <a:r>
+              <a:rPr lang="en-CA" dirty="0" smtClean="0"/>
+              <a:t>Binary tree that divides input space into hyperplane, then splits each partition recursively</a:t>
+            </a:r>
+          </a:p>
+          <a:p>
+            <a:pPr lvl="1"/>
+            <a:r>
+              <a:rPr lang="en-CA" dirty="0" err="1" smtClean="0"/>
+              <a:t>kD</a:t>
+            </a:r>
+            <a:r>
+              <a:rPr lang="en-CA" dirty="0" smtClean="0"/>
+              <a:t>-tree because it stores a set of points in k-dimensional space</a:t>
+            </a:r>
+          </a:p>
+          <a:p>
+            <a:endParaRPr lang="en-CA" dirty="0"/>
+          </a:p>
+        </p:txBody>
+      </p:sp>
+    </p:spTree>
+    <p:extLst>
+      <p:ext uri="{BB962C8B-B14F-4D97-AF65-F5344CB8AC3E}">
+        <p14:creationId xmlns:p14="http://schemas.microsoft.com/office/powerpoint/2010/main" val="4023348834"/>
+      </p:ext>
+    </p:extLst>
+  </p:cSld>
+  <p:clrMapOvr>
+    <a:masterClrMapping/>
+  </p:clrMapOvr>
+  <p:timing>
+    <p:tnLst>
+      <p:par>
+        <p:cTn id="1" dur="indefinite" restart="never" nodeType="tmRoot"/>
+      </p:par>
+    </p:tnLst>
+  </p:timing>
+</p:sld>
+</file>
+
+<file path=ppt/slides/slide38.xml><?xml version="1.0" encoding="utf-8"?>
+<p:sld xmlns:a="http://schemas.openxmlformats.org/drawingml/2006/main" xmlns:r="http://schemas.openxmlformats.org/officeDocument/2006/relationships" xmlns:p="http://schemas.openxmlformats.org/presentationml/2006/main">
+  <p:cSld>
+    <p:spTree>
+      <p:nvGrpSpPr>
+        <p:cNvPr id="1" name=""/>
+        <p:cNvGrpSpPr/>
+        <p:nvPr/>
+      </p:nvGrpSpPr>
+      <p:grpSpPr>
+        <a:xfrm>
+          <a:off x="0" y="0"/>
+          <a:ext cx="0" cy="0"/>
+          <a:chOff x="0" y="0"/>
+          <a:chExt cx="0" cy="0"/>
+        </a:xfrm>
+      </p:grpSpPr>
+      <p:sp>
+        <p:nvSpPr>
+          <p:cNvPr id="2" name="Title 1"/>
+          <p:cNvSpPr>
+            <a:spLocks noGrp="1"/>
+          </p:cNvSpPr>
+          <p:nvPr>
+            <p:ph type="title"/>
+          </p:nvPr>
+        </p:nvSpPr>
+        <p:spPr/>
+        <p:txBody>
+          <a:bodyPr/>
+          <a:lstStyle/>
+          <a:p>
+            <a:r>
+              <a:rPr lang="en-CA" dirty="0" err="1" smtClean="0"/>
+              <a:t>kD</a:t>
+            </a:r>
+            <a:r>
+              <a:rPr lang="en-CA" dirty="0" smtClean="0"/>
+              <a:t>-tree example pg136</a:t>
+            </a:r>
+            <a:endParaRPr lang="en-CA" dirty="0"/>
+          </a:p>
+        </p:txBody>
+      </p:sp>
+      <p:sp>
+        <p:nvSpPr>
+          <p:cNvPr id="3" name="Content Placeholder 2"/>
+          <p:cNvSpPr>
+            <a:spLocks noGrp="1"/>
+          </p:cNvSpPr>
+          <p:nvPr>
+            <p:ph idx="1"/>
+          </p:nvPr>
+        </p:nvSpPr>
+        <p:spPr/>
+        <p:txBody>
+          <a:bodyPr/>
+          <a:lstStyle/>
+          <a:p>
+            <a:r>
+              <a:rPr lang="en-CA" dirty="0" smtClean="0"/>
+              <a:t>k=2</a:t>
+            </a:r>
+          </a:p>
+          <a:p>
+            <a:r>
+              <a:rPr lang="en-CA" dirty="0" smtClean="0"/>
+              <a:t>Note – hyperplanes are not decision boundaries!</a:t>
+            </a:r>
+          </a:p>
+          <a:p>
+            <a:r>
+              <a:rPr lang="en-CA" dirty="0" smtClean="0"/>
+              <a:t>All splits are made parallel to one of the axes</a:t>
+            </a:r>
+          </a:p>
+          <a:p>
+            <a:r>
+              <a:rPr lang="en-CA" dirty="0" smtClean="0"/>
+              <a:t>How to build </a:t>
+            </a:r>
+            <a:r>
+              <a:rPr lang="en-CA" dirty="0" err="1" smtClean="0"/>
+              <a:t>kD</a:t>
+            </a:r>
+            <a:r>
+              <a:rPr lang="en-CA" dirty="0" smtClean="0"/>
+              <a:t>-tree from dataset?</a:t>
+            </a:r>
+          </a:p>
+          <a:p>
+            <a:r>
+              <a:rPr lang="en-CA" dirty="0" smtClean="0"/>
+              <a:t>Can it be updated efficiently as new examples are added?</a:t>
+            </a:r>
+          </a:p>
+          <a:p>
+            <a:r>
+              <a:rPr lang="en-CA" dirty="0" smtClean="0"/>
+              <a:t>How does it speed up nearest-neighbour calculations?</a:t>
+            </a:r>
+          </a:p>
+          <a:p>
+            <a:r>
+              <a:rPr lang="en-CA" dirty="0" smtClean="0"/>
+              <a:t>Give full </a:t>
+            </a:r>
+            <a:r>
+              <a:rPr lang="en-CA" dirty="0" err="1" smtClean="0"/>
+              <a:t>kD</a:t>
+            </a:r>
+            <a:r>
+              <a:rPr lang="en-CA" dirty="0" smtClean="0"/>
+              <a:t> tree example with partitioned space</a:t>
+            </a:r>
+            <a:endParaRPr lang="en-CA" dirty="0"/>
+          </a:p>
+        </p:txBody>
+      </p:sp>
+    </p:spTree>
+    <p:extLst>
+      <p:ext uri="{BB962C8B-B14F-4D97-AF65-F5344CB8AC3E}">
+        <p14:creationId xmlns:p14="http://schemas.microsoft.com/office/powerpoint/2010/main" val="1552773842"/>
+      </p:ext>
+    </p:extLst>
+  </p:cSld>
+  <p:clrMapOvr>
+    <a:masterClrMapping/>
+  </p:clrMapOvr>
+  <p:timing>
+    <p:tnLst>
+      <p:par>
+        <p:cTn id="1" dur="indefinite" restart="never" nodeType="tmRoot"/>
+      </p:par>
+    </p:tnLst>
+  </p:timing>
 </p:sld>
 </file>
 
@@ -3418,6 +7376,13 @@
   <p:clrMapOvr>
     <a:masterClrMapping/>
   </p:clrMapOvr>
+  <p:timing>
+    <p:tnLst>
+      <p:par>
+        <p:cTn id="1" dur="indefinite" restart="never" nodeType="tmRoot"/>
+      </p:par>
+    </p:tnLst>
+  </p:timing>
 </p:sld>
 </file>
 
@@ -3484,11 +7449,17 @@
           <a:p>
             <a:r>
               <a:rPr lang="en-CA" dirty="0" smtClean="0"/>
-              <a:t>Convert numeric to nominal by sorting and </a:t>
-            </a:r>
-            <a:r>
-              <a:rPr lang="en-CA" smtClean="0"/>
-              <a:t>placing breakpoints</a:t>
+              <a:t>Convert numeric to nominal by sorting and placing </a:t>
+            </a:r>
+            <a:r>
+              <a:rPr lang="en-CA" dirty="0" smtClean="0"/>
+              <a:t>breakpoints</a:t>
+            </a:r>
+          </a:p>
+          <a:p>
+            <a:r>
+              <a:rPr lang="en-CA" dirty="0" smtClean="0"/>
+              <a:t>Can be problematic for 1R because many classes are formed</a:t>
             </a:r>
             <a:endParaRPr lang="en-CA" dirty="0"/>
           </a:p>
@@ -3504,6 +7475,521 @@
   <p:clrMapOvr>
     <a:masterClrMapping/>
   </p:clrMapOvr>
+  <p:timing>
+    <p:tnLst>
+      <p:par>
+        <p:cTn id="1" dur="indefinite" restart="never" nodeType="tmRoot"/>
+      </p:par>
+    </p:tnLst>
+  </p:timing>
+</p:sld>
+</file>
+
+<file path=ppt/slides/slide6.xml><?xml version="1.0" encoding="utf-8"?>
+<p:sld xmlns:a="http://schemas.openxmlformats.org/drawingml/2006/main" xmlns:r="http://schemas.openxmlformats.org/officeDocument/2006/relationships" xmlns:p="http://schemas.openxmlformats.org/presentationml/2006/main">
+  <p:cSld>
+    <p:spTree>
+      <p:nvGrpSpPr>
+        <p:cNvPr id="1" name=""/>
+        <p:cNvGrpSpPr/>
+        <p:nvPr/>
+      </p:nvGrpSpPr>
+      <p:grpSpPr>
+        <a:xfrm>
+          <a:off x="0" y="0"/>
+          <a:ext cx="0" cy="0"/>
+          <a:chOff x="0" y="0"/>
+          <a:chExt cx="0" cy="0"/>
+        </a:xfrm>
+      </p:grpSpPr>
+      <p:sp>
+        <p:nvSpPr>
+          <p:cNvPr id="2" name="Title 1"/>
+          <p:cNvSpPr>
+            <a:spLocks noGrp="1"/>
+          </p:cNvSpPr>
+          <p:nvPr>
+            <p:ph type="title"/>
+          </p:nvPr>
+        </p:nvSpPr>
+        <p:spPr/>
+        <p:txBody>
+          <a:bodyPr/>
+          <a:lstStyle/>
+          <a:p>
+            <a:r>
+              <a:rPr lang="en-CA" dirty="0" smtClean="0"/>
+              <a:t>Simple probabilistic modeling </a:t>
+            </a:r>
+            <a:r>
+              <a:rPr lang="en-CA" dirty="0" err="1" smtClean="0"/>
+              <a:t>pg</a:t>
+            </a:r>
+            <a:r>
+              <a:rPr lang="en-CA" dirty="0" smtClean="0"/>
+              <a:t> 97</a:t>
+            </a:r>
+            <a:endParaRPr lang="en-CA" dirty="0"/>
+          </a:p>
+        </p:txBody>
+      </p:sp>
+      <p:sp>
+        <p:nvSpPr>
+          <p:cNvPr id="3" name="Content Placeholder 2"/>
+          <p:cNvSpPr>
+            <a:spLocks noGrp="1"/>
+          </p:cNvSpPr>
+          <p:nvPr>
+            <p:ph idx="1"/>
+          </p:nvPr>
+        </p:nvSpPr>
+        <p:spPr/>
+        <p:txBody>
+          <a:bodyPr/>
+          <a:lstStyle/>
+          <a:p>
+            <a:r>
+              <a:rPr lang="en-CA" dirty="0" smtClean="0"/>
+              <a:t>1R uses a single attribute, but another approach is to combine all the attributes</a:t>
+            </a:r>
+          </a:p>
+          <a:p>
+            <a:r>
+              <a:rPr lang="en-CA" dirty="0" smtClean="0"/>
+              <a:t>For a new instance, multiply all the likelihoods together and normalize (</a:t>
+            </a:r>
+            <a:r>
+              <a:rPr lang="en-CA" dirty="0" err="1" smtClean="0"/>
+              <a:t>bayes</a:t>
+            </a:r>
+            <a:r>
+              <a:rPr lang="en-CA" dirty="0" smtClean="0"/>
+              <a:t> rule)</a:t>
+            </a:r>
+          </a:p>
+          <a:p>
+            <a:r>
+              <a:rPr lang="en-CA" dirty="0" smtClean="0"/>
+              <a:t>Naïve </a:t>
+            </a:r>
+            <a:r>
+              <a:rPr lang="en-CA" dirty="0" err="1" smtClean="0"/>
+              <a:t>bayes</a:t>
+            </a:r>
+            <a:r>
+              <a:rPr lang="en-CA" dirty="0" smtClean="0"/>
+              <a:t> (assumes independence)</a:t>
+            </a:r>
+          </a:p>
+          <a:p>
+            <a:r>
+              <a:rPr lang="en-CA" dirty="0" smtClean="0"/>
+              <a:t>Can add </a:t>
+            </a:r>
+            <a:r>
+              <a:rPr lang="en-CA" dirty="0" err="1" smtClean="0"/>
+              <a:t>laplace</a:t>
+            </a:r>
+            <a:r>
+              <a:rPr lang="en-CA" dirty="0" smtClean="0"/>
+              <a:t> estimator to correct for 0s in Naïve Bayes</a:t>
+            </a:r>
+          </a:p>
+          <a:p>
+            <a:r>
+              <a:rPr lang="en-CA" dirty="0" smtClean="0"/>
+              <a:t>Can think of the </a:t>
+            </a:r>
+            <a:r>
+              <a:rPr lang="en-CA" dirty="0" err="1" smtClean="0"/>
+              <a:t>laplace</a:t>
+            </a:r>
+            <a:r>
+              <a:rPr lang="en-CA" dirty="0" smtClean="0"/>
+              <a:t> estimator as a prior distribution</a:t>
+            </a:r>
+          </a:p>
+        </p:txBody>
+      </p:sp>
+    </p:spTree>
+    <p:extLst>
+      <p:ext uri="{BB962C8B-B14F-4D97-AF65-F5344CB8AC3E}">
+        <p14:creationId xmlns:p14="http://schemas.microsoft.com/office/powerpoint/2010/main" val="1307109215"/>
+      </p:ext>
+    </p:extLst>
+  </p:cSld>
+  <p:clrMapOvr>
+    <a:masterClrMapping/>
+  </p:clrMapOvr>
+  <p:timing>
+    <p:tnLst>
+      <p:par>
+        <p:cTn id="1" dur="indefinite" restart="never" nodeType="tmRoot"/>
+      </p:par>
+    </p:tnLst>
+  </p:timing>
+</p:sld>
+</file>
+
+<file path=ppt/slides/slide7.xml><?xml version="1.0" encoding="utf-8"?>
+<p:sld xmlns:a="http://schemas.openxmlformats.org/drawingml/2006/main" xmlns:r="http://schemas.openxmlformats.org/officeDocument/2006/relationships" xmlns:p="http://schemas.openxmlformats.org/presentationml/2006/main">
+  <p:cSld>
+    <p:spTree>
+      <p:nvGrpSpPr>
+        <p:cNvPr id="1" name=""/>
+        <p:cNvGrpSpPr/>
+        <p:nvPr/>
+      </p:nvGrpSpPr>
+      <p:grpSpPr>
+        <a:xfrm>
+          <a:off x="0" y="0"/>
+          <a:ext cx="0" cy="0"/>
+          <a:chOff x="0" y="0"/>
+          <a:chExt cx="0" cy="0"/>
+        </a:xfrm>
+      </p:grpSpPr>
+      <p:sp>
+        <p:nvSpPr>
+          <p:cNvPr id="2" name="Title 1"/>
+          <p:cNvSpPr>
+            <a:spLocks noGrp="1"/>
+          </p:cNvSpPr>
+          <p:nvPr>
+            <p:ph type="title"/>
+          </p:nvPr>
+        </p:nvSpPr>
+        <p:spPr/>
+        <p:txBody>
+          <a:bodyPr/>
+          <a:lstStyle/>
+          <a:p>
+            <a:r>
+              <a:rPr lang="en-CA" dirty="0" smtClean="0"/>
+              <a:t>Missing values and numeric attributes for Naïve Bayes</a:t>
+            </a:r>
+            <a:endParaRPr lang="en-CA" dirty="0"/>
+          </a:p>
+        </p:txBody>
+      </p:sp>
+      <p:sp>
+        <p:nvSpPr>
+          <p:cNvPr id="3" name="Content Placeholder 2"/>
+          <p:cNvSpPr>
+            <a:spLocks noGrp="1"/>
+          </p:cNvSpPr>
+          <p:nvPr>
+            <p:ph idx="1"/>
+          </p:nvPr>
+        </p:nvSpPr>
+        <p:spPr/>
+        <p:txBody>
+          <a:bodyPr/>
+          <a:lstStyle/>
+          <a:p>
+            <a:r>
+              <a:rPr lang="en-CA" dirty="0" smtClean="0"/>
+              <a:t>Can simply leave attributes out of calculation if missing</a:t>
+            </a:r>
+          </a:p>
+          <a:p>
+            <a:r>
+              <a:rPr lang="en-CA" dirty="0" smtClean="0"/>
+              <a:t>If we are using numeric values, we can calculate the mean and </a:t>
+            </a:r>
+            <a:r>
+              <a:rPr lang="en-CA" dirty="0" err="1" smtClean="0"/>
+              <a:t>std</a:t>
+            </a:r>
+            <a:r>
+              <a:rPr lang="en-CA" dirty="0" smtClean="0"/>
+              <a:t> assuming a Gaussian distribution and use this to get the probabilities</a:t>
+            </a:r>
+          </a:p>
+          <a:p>
+            <a:r>
+              <a:rPr lang="en-CA" dirty="0" smtClean="0"/>
+              <a:t>Normal distribution assumption makes it easy to extend naïve </a:t>
+            </a:r>
+            <a:r>
+              <a:rPr lang="en-CA" dirty="0" err="1" smtClean="0"/>
+              <a:t>bayes</a:t>
+            </a:r>
+            <a:r>
+              <a:rPr lang="en-CA" dirty="0" smtClean="0"/>
+              <a:t> to deal with numeric attributes</a:t>
+            </a:r>
+          </a:p>
+          <a:p>
+            <a:endParaRPr lang="en-CA" dirty="0" smtClean="0"/>
+          </a:p>
+          <a:p>
+            <a:endParaRPr lang="en-CA" dirty="0"/>
+          </a:p>
+        </p:txBody>
+      </p:sp>
+    </p:spTree>
+    <p:extLst>
+      <p:ext uri="{BB962C8B-B14F-4D97-AF65-F5344CB8AC3E}">
+        <p14:creationId xmlns:p14="http://schemas.microsoft.com/office/powerpoint/2010/main" val="3761985188"/>
+      </p:ext>
+    </p:extLst>
+  </p:cSld>
+  <p:clrMapOvr>
+    <a:masterClrMapping/>
+  </p:clrMapOvr>
+  <p:timing>
+    <p:tnLst>
+      <p:par>
+        <p:cTn id="1" dur="indefinite" restart="never" nodeType="tmRoot"/>
+      </p:par>
+    </p:tnLst>
+  </p:timing>
+</p:sld>
+</file>
+
+<file path=ppt/slides/slide8.xml><?xml version="1.0" encoding="utf-8"?>
+<p:sld xmlns:a="http://schemas.openxmlformats.org/drawingml/2006/main" xmlns:r="http://schemas.openxmlformats.org/officeDocument/2006/relationships" xmlns:p="http://schemas.openxmlformats.org/presentationml/2006/main">
+  <p:cSld>
+    <p:spTree>
+      <p:nvGrpSpPr>
+        <p:cNvPr id="1" name=""/>
+        <p:cNvGrpSpPr/>
+        <p:nvPr/>
+      </p:nvGrpSpPr>
+      <p:grpSpPr>
+        <a:xfrm>
+          <a:off x="0" y="0"/>
+          <a:ext cx="0" cy="0"/>
+          <a:chOff x="0" y="0"/>
+          <a:chExt cx="0" cy="0"/>
+        </a:xfrm>
+      </p:grpSpPr>
+      <p:sp>
+        <p:nvSpPr>
+          <p:cNvPr id="2" name="Title 1"/>
+          <p:cNvSpPr>
+            <a:spLocks noGrp="1"/>
+          </p:cNvSpPr>
+          <p:nvPr>
+            <p:ph type="title"/>
+          </p:nvPr>
+        </p:nvSpPr>
+        <p:spPr/>
+        <p:txBody>
+          <a:bodyPr/>
+          <a:lstStyle/>
+          <a:p>
+            <a:r>
+              <a:rPr lang="en-CA" dirty="0" smtClean="0"/>
+              <a:t>Naïve </a:t>
+            </a:r>
+            <a:r>
+              <a:rPr lang="en-CA" dirty="0" err="1" smtClean="0"/>
+              <a:t>bayes</a:t>
+            </a:r>
+            <a:r>
+              <a:rPr lang="en-CA" dirty="0" smtClean="0"/>
+              <a:t> for document classification </a:t>
+            </a:r>
+            <a:r>
+              <a:rPr lang="en-CA" dirty="0" err="1" smtClean="0"/>
+              <a:t>pg</a:t>
+            </a:r>
+            <a:r>
+              <a:rPr lang="en-CA" dirty="0" smtClean="0"/>
+              <a:t> 103</a:t>
+            </a:r>
+            <a:endParaRPr lang="en-CA" dirty="0"/>
+          </a:p>
+        </p:txBody>
+      </p:sp>
+      <p:sp>
+        <p:nvSpPr>
+          <p:cNvPr id="3" name="Content Placeholder 2"/>
+          <p:cNvSpPr>
+            <a:spLocks noGrp="1"/>
+          </p:cNvSpPr>
+          <p:nvPr>
+            <p:ph idx="1"/>
+          </p:nvPr>
+        </p:nvSpPr>
+        <p:spPr/>
+        <p:txBody>
+          <a:bodyPr/>
+          <a:lstStyle/>
+          <a:p>
+            <a:r>
+              <a:rPr lang="en-CA" dirty="0" smtClean="0"/>
+              <a:t>A document can be viewed as a bag of words</a:t>
+            </a:r>
+          </a:p>
+          <a:p>
+            <a:r>
+              <a:rPr lang="en-CA" dirty="0" smtClean="0"/>
+              <a:t>Can accommodate word frequencies using multinomial naïve </a:t>
+            </a:r>
+            <a:r>
+              <a:rPr lang="en-CA" dirty="0" err="1" smtClean="0"/>
+              <a:t>bayes</a:t>
+            </a:r>
+            <a:endParaRPr lang="en-CA" dirty="0" smtClean="0"/>
+          </a:p>
+          <a:p>
+            <a:r>
+              <a:rPr lang="en-CA" dirty="0" smtClean="0"/>
+              <a:t>Difference from naïve </a:t>
+            </a:r>
+            <a:r>
+              <a:rPr lang="en-CA" dirty="0" err="1" smtClean="0"/>
+              <a:t>bayes</a:t>
+            </a:r>
+            <a:r>
+              <a:rPr lang="en-CA" dirty="0" smtClean="0"/>
+              <a:t> to multinomial naïve </a:t>
+            </a:r>
+            <a:r>
+              <a:rPr lang="en-CA" dirty="0" err="1" smtClean="0"/>
+              <a:t>bayes</a:t>
+            </a:r>
+            <a:r>
+              <a:rPr lang="en-CA" dirty="0" smtClean="0"/>
+              <a:t>?</a:t>
+            </a:r>
+          </a:p>
+          <a:p>
+            <a:endParaRPr lang="en-CA" dirty="0" smtClean="0"/>
+          </a:p>
+          <a:p>
+            <a:endParaRPr lang="en-CA" dirty="0"/>
+          </a:p>
+        </p:txBody>
+      </p:sp>
+    </p:spTree>
+    <p:extLst>
+      <p:ext uri="{BB962C8B-B14F-4D97-AF65-F5344CB8AC3E}">
+        <p14:creationId xmlns:p14="http://schemas.microsoft.com/office/powerpoint/2010/main" val="1665998698"/>
+      </p:ext>
+    </p:extLst>
+  </p:cSld>
+  <p:clrMapOvr>
+    <a:masterClrMapping/>
+  </p:clrMapOvr>
+  <p:timing>
+    <p:tnLst>
+      <p:par>
+        <p:cTn id="1" dur="indefinite" restart="never" nodeType="tmRoot"/>
+      </p:par>
+    </p:tnLst>
+  </p:timing>
+</p:sld>
+</file>
+
+<file path=ppt/slides/slide9.xml><?xml version="1.0" encoding="utf-8"?>
+<p:sld xmlns:a="http://schemas.openxmlformats.org/drawingml/2006/main" xmlns:r="http://schemas.openxmlformats.org/officeDocument/2006/relationships" xmlns:p="http://schemas.openxmlformats.org/presentationml/2006/main">
+  <p:cSld>
+    <p:spTree>
+      <p:nvGrpSpPr>
+        <p:cNvPr id="1" name=""/>
+        <p:cNvGrpSpPr/>
+        <p:nvPr/>
+      </p:nvGrpSpPr>
+      <p:grpSpPr>
+        <a:xfrm>
+          <a:off x="0" y="0"/>
+          <a:ext cx="0" cy="0"/>
+          <a:chOff x="0" y="0"/>
+          <a:chExt cx="0" cy="0"/>
+        </a:xfrm>
+      </p:grpSpPr>
+      <p:sp>
+        <p:nvSpPr>
+          <p:cNvPr id="2" name="Title 1"/>
+          <p:cNvSpPr>
+            <a:spLocks noGrp="1"/>
+          </p:cNvSpPr>
+          <p:nvPr>
+            <p:ph type="title"/>
+          </p:nvPr>
+        </p:nvSpPr>
+        <p:spPr/>
+        <p:txBody>
+          <a:bodyPr/>
+          <a:lstStyle/>
+          <a:p>
+            <a:r>
+              <a:rPr lang="en-CA" dirty="0" smtClean="0"/>
+              <a:t>Remarks pg105</a:t>
+            </a:r>
+            <a:endParaRPr lang="en-CA" dirty="0"/>
+          </a:p>
+        </p:txBody>
+      </p:sp>
+      <p:sp>
+        <p:nvSpPr>
+          <p:cNvPr id="3" name="Content Placeholder 2"/>
+          <p:cNvSpPr>
+            <a:spLocks noGrp="1"/>
+          </p:cNvSpPr>
+          <p:nvPr>
+            <p:ph idx="1"/>
+          </p:nvPr>
+        </p:nvSpPr>
+        <p:spPr/>
+        <p:txBody>
+          <a:bodyPr/>
+          <a:lstStyle/>
+          <a:p>
+            <a:r>
+              <a:rPr lang="en-CA" dirty="0" smtClean="0"/>
+              <a:t>Naïve </a:t>
+            </a:r>
+            <a:r>
+              <a:rPr lang="en-CA" dirty="0" err="1" smtClean="0"/>
+              <a:t>bayes</a:t>
+            </a:r>
+            <a:r>
+              <a:rPr lang="en-CA" dirty="0" smtClean="0"/>
+              <a:t> often outperforms more sophisticated classifiers</a:t>
+            </a:r>
+          </a:p>
+          <a:p>
+            <a:r>
+              <a:rPr lang="en-CA" dirty="0" smtClean="0"/>
+              <a:t>Try the simple things first! (1R, Naïve Bayes)</a:t>
+            </a:r>
+          </a:p>
+          <a:p>
+            <a:r>
+              <a:rPr lang="en-CA" dirty="0" smtClean="0"/>
+              <a:t>Maximizing classification accuracy does not require particularly accurate probability estimates, it is sufficient for the correct class to receive the greatest probability</a:t>
+            </a:r>
+          </a:p>
+          <a:p>
+            <a:r>
+              <a:rPr lang="en-CA" dirty="0" smtClean="0"/>
+              <a:t>Limitations: normal distribution assumption, redundant attributes</a:t>
+            </a:r>
+            <a:endParaRPr lang="en-CA" dirty="0"/>
+          </a:p>
+        </p:txBody>
+      </p:sp>
+    </p:spTree>
+    <p:extLst>
+      <p:ext uri="{BB962C8B-B14F-4D97-AF65-F5344CB8AC3E}">
+        <p14:creationId xmlns:p14="http://schemas.microsoft.com/office/powerpoint/2010/main" val="3560758215"/>
+      </p:ext>
+    </p:extLst>
+  </p:cSld>
+  <p:clrMapOvr>
+    <a:masterClrMapping/>
+  </p:clrMapOvr>
+  <p:timing>
+    <p:tnLst>
+      <p:par>
+        <p:cTn id="1" dur="indefinite" restart="never" nodeType="tmRoot"/>
+      </p:par>
+    </p:tnLst>
+  </p:timing>
 </p:sld>
 </file>
 

</xml_diff>